<commit_message>
Issue 1557 : index.html: add a space for user comments Update Issue 1557 Status: Delivered Merged with some changes
Former-commit-id: 464b953e26c9f691b7e1dfc1e6322d145a0ff81b
Former-commit-id: c0b762f95dfc47e13b2e7da416afc000b1bb5979
Former-commit-id: 22e3c33cbb75898625794aa11c9fcad4b5064170
</commit_message>
<xml_diff>
--- a/doc/mockups/InfoBytes.pptx
+++ b/doc/mockups/InfoBytes.pptx
@@ -6,11 +6,12 @@
   </p:sldMasterIdLst>
   <p:sldIdLst>
     <p:sldId id="257" r:id="rId2"/>
-    <p:sldId id="263" r:id="rId3"/>
-    <p:sldId id="259" r:id="rId4"/>
-    <p:sldId id="260" r:id="rId5"/>
-    <p:sldId id="261" r:id="rId6"/>
-    <p:sldId id="262" r:id="rId7"/>
+    <p:sldId id="264" r:id="rId3"/>
+    <p:sldId id="263" r:id="rId4"/>
+    <p:sldId id="259" r:id="rId5"/>
+    <p:sldId id="260" r:id="rId6"/>
+    <p:sldId id="261" r:id="rId7"/>
+    <p:sldId id="262" r:id="rId8"/>
   </p:sldIdLst>
   <p:sldSz cx="2743200" cy="2011363"/>
   <p:notesSz cx="6858000" cy="9144000"/>
@@ -294,7 +295,7 @@
             <a:fld id="{1D8BD707-D9CF-40AE-B4C6-C98DA3205C09}" type="datetimeFigureOut">
               <a:rPr lang="en-US" smtClean="0"/>
               <a:pPr/>
-              <a:t>3/7/2013</a:t>
+              <a:t>4/5/2014</a:t>
             </a:fld>
             <a:endParaRPr lang="en-US"/>
           </a:p>
@@ -514,7 +515,7 @@
             <a:fld id="{1D8BD707-D9CF-40AE-B4C6-C98DA3205C09}" type="datetimeFigureOut">
               <a:rPr lang="en-US" smtClean="0"/>
               <a:pPr/>
-              <a:t>3/7/2013</a:t>
+              <a:t>4/5/2014</a:t>
             </a:fld>
             <a:endParaRPr lang="en-US"/>
           </a:p>
@@ -691,7 +692,7 @@
             <a:fld id="{1D8BD707-D9CF-40AE-B4C6-C98DA3205C09}" type="datetimeFigureOut">
               <a:rPr lang="en-US" smtClean="0"/>
               <a:pPr/>
-              <a:t>3/7/2013</a:t>
+              <a:t>4/5/2014</a:t>
             </a:fld>
             <a:endParaRPr lang="en-US"/>
           </a:p>
@@ -858,7 +859,7 @@
             <a:fld id="{1D8BD707-D9CF-40AE-B4C6-C98DA3205C09}" type="datetimeFigureOut">
               <a:rPr lang="en-US" smtClean="0"/>
               <a:pPr/>
-              <a:t>3/7/2013</a:t>
+              <a:t>4/5/2014</a:t>
             </a:fld>
             <a:endParaRPr lang="en-US"/>
           </a:p>
@@ -1101,7 +1102,7 @@
             <a:fld id="{1D8BD707-D9CF-40AE-B4C6-C98DA3205C09}" type="datetimeFigureOut">
               <a:rPr lang="en-US" smtClean="0"/>
               <a:pPr/>
-              <a:t>3/7/2013</a:t>
+              <a:t>4/5/2014</a:t>
             </a:fld>
             <a:endParaRPr lang="en-US"/>
           </a:p>
@@ -1386,7 +1387,7 @@
             <a:fld id="{1D8BD707-D9CF-40AE-B4C6-C98DA3205C09}" type="datetimeFigureOut">
               <a:rPr lang="en-US" smtClean="0"/>
               <a:pPr/>
-              <a:t>3/7/2013</a:t>
+              <a:t>4/5/2014</a:t>
             </a:fld>
             <a:endParaRPr lang="en-US"/>
           </a:p>
@@ -1805,7 +1806,7 @@
             <a:fld id="{1D8BD707-D9CF-40AE-B4C6-C98DA3205C09}" type="datetimeFigureOut">
               <a:rPr lang="en-US" smtClean="0"/>
               <a:pPr/>
-              <a:t>3/7/2013</a:t>
+              <a:t>4/5/2014</a:t>
             </a:fld>
             <a:endParaRPr lang="en-US"/>
           </a:p>
@@ -1920,7 +1921,7 @@
             <a:fld id="{1D8BD707-D9CF-40AE-B4C6-C98DA3205C09}" type="datetimeFigureOut">
               <a:rPr lang="en-US" smtClean="0"/>
               <a:pPr/>
-              <a:t>3/7/2013</a:t>
+              <a:t>4/5/2014</a:t>
             </a:fld>
             <a:endParaRPr lang="en-US"/>
           </a:p>
@@ -2012,7 +2013,7 @@
             <a:fld id="{1D8BD707-D9CF-40AE-B4C6-C98DA3205C09}" type="datetimeFigureOut">
               <a:rPr lang="en-US" smtClean="0"/>
               <a:pPr/>
-              <a:t>3/7/2013</a:t>
+              <a:t>4/5/2014</a:t>
             </a:fld>
             <a:endParaRPr lang="en-US"/>
           </a:p>
@@ -2286,7 +2287,7 @@
             <a:fld id="{1D8BD707-D9CF-40AE-B4C6-C98DA3205C09}" type="datetimeFigureOut">
               <a:rPr lang="en-US" smtClean="0"/>
               <a:pPr/>
-              <a:t>3/7/2013</a:t>
+              <a:t>4/5/2014</a:t>
             </a:fld>
             <a:endParaRPr lang="en-US"/>
           </a:p>
@@ -2536,7 +2537,7 @@
             <a:fld id="{1D8BD707-D9CF-40AE-B4C6-C98DA3205C09}" type="datetimeFigureOut">
               <a:rPr lang="en-US" smtClean="0"/>
               <a:pPr/>
-              <a:t>3/7/2013</a:t>
+              <a:t>4/5/2014</a:t>
             </a:fld>
             <a:endParaRPr lang="en-US"/>
           </a:p>
@@ -2746,7 +2747,7 @@
             <a:fld id="{1D8BD707-D9CF-40AE-B4C6-C98DA3205C09}" type="datetimeFigureOut">
               <a:rPr lang="en-US" smtClean="0"/>
               <a:pPr/>
-              <a:t>3/7/2013</a:t>
+              <a:t>4/5/2014</a:t>
             </a:fld>
             <a:endParaRPr lang="en-US"/>
           </a:p>
@@ -3119,60 +3120,6 @@
       </p:grpSpPr>
       <p:sp>
         <p:nvSpPr>
-          <p:cNvPr id="11" name="Cloud Callout 10"/>
-          <p:cNvSpPr/>
-          <p:nvPr/>
-        </p:nvSpPr>
-        <p:spPr>
-          <a:xfrm>
-            <a:off x="609600" y="-61119"/>
-            <a:ext cx="1447799" cy="744451"/>
-          </a:xfrm>
-          <a:prstGeom prst="cloudCallout">
-            <a:avLst>
-              <a:gd name="adj1" fmla="val -24485"/>
-              <a:gd name="adj2" fmla="val 99222"/>
-            </a:avLst>
-          </a:prstGeom>
-          <a:solidFill>
-            <a:schemeClr val="bg1"/>
-          </a:solidFill>
-          <a:ln>
-            <a:solidFill>
-              <a:schemeClr val="bg1"/>
-            </a:solidFill>
-          </a:ln>
-          <a:effectLst>
-            <a:softEdge rad="31750"/>
-          </a:effectLst>
-        </p:spPr>
-        <p:style>
-          <a:lnRef idx="2">
-            <a:schemeClr val="accent1">
-              <a:shade val="50000"/>
-            </a:schemeClr>
-          </a:lnRef>
-          <a:fillRef idx="1">
-            <a:schemeClr val="accent1"/>
-          </a:fillRef>
-          <a:effectRef idx="0">
-            <a:schemeClr val="accent1"/>
-          </a:effectRef>
-          <a:fontRef idx="minor">
-            <a:schemeClr val="lt1"/>
-          </a:fontRef>
-        </p:style>
-        <p:txBody>
-          <a:bodyPr rtlCol="0" anchor="ctr"/>
-          <a:lstStyle/>
-          <a:p>
-            <a:pPr algn="ctr"/>
-            <a:endParaRPr lang="en-US"/>
-          </a:p>
-        </p:txBody>
-      </p:sp>
-      <p:sp>
-        <p:nvSpPr>
           <p:cNvPr id="12" name="Cloud Callout 11"/>
           <p:cNvSpPr/>
           <p:nvPr/>
@@ -3197,96 +3144,6 @@
           <a:effectLst>
             <a:softEdge rad="31750"/>
           </a:effectLst>
-        </p:spPr>
-        <p:style>
-          <a:lnRef idx="2">
-            <a:schemeClr val="accent1">
-              <a:shade val="50000"/>
-            </a:schemeClr>
-          </a:lnRef>
-          <a:fillRef idx="1">
-            <a:schemeClr val="accent1"/>
-          </a:fillRef>
-          <a:effectRef idx="0">
-            <a:schemeClr val="accent1"/>
-          </a:effectRef>
-          <a:fontRef idx="minor">
-            <a:schemeClr val="lt1"/>
-          </a:fontRef>
-        </p:style>
-        <p:txBody>
-          <a:bodyPr rtlCol="0" anchor="ctr"/>
-          <a:lstStyle/>
-          <a:p>
-            <a:pPr algn="ctr"/>
-            <a:endParaRPr lang="en-US"/>
-          </a:p>
-        </p:txBody>
-      </p:sp>
-      <p:sp>
-        <p:nvSpPr>
-          <p:cNvPr id="2" name="Cloud Callout 1"/>
-          <p:cNvSpPr/>
-          <p:nvPr/>
-        </p:nvSpPr>
-        <p:spPr>
-          <a:xfrm>
-            <a:off x="762000" y="24883"/>
-            <a:ext cx="1143000" cy="658448"/>
-          </a:xfrm>
-          <a:prstGeom prst="cloudCallout">
-            <a:avLst>
-              <a:gd name="adj1" fmla="val -24485"/>
-              <a:gd name="adj2" fmla="val 99222"/>
-            </a:avLst>
-          </a:prstGeom>
-          <a:solidFill>
-            <a:schemeClr val="bg1"/>
-          </a:solidFill>
-        </p:spPr>
-        <p:style>
-          <a:lnRef idx="2">
-            <a:schemeClr val="accent1">
-              <a:shade val="50000"/>
-            </a:schemeClr>
-          </a:lnRef>
-          <a:fillRef idx="1">
-            <a:schemeClr val="accent1"/>
-          </a:fillRef>
-          <a:effectRef idx="0">
-            <a:schemeClr val="accent1"/>
-          </a:effectRef>
-          <a:fontRef idx="minor">
-            <a:schemeClr val="lt1"/>
-          </a:fontRef>
-        </p:style>
-        <p:txBody>
-          <a:bodyPr rtlCol="0" anchor="ctr"/>
-          <a:lstStyle/>
-          <a:p>
-            <a:pPr algn="ctr"/>
-            <a:endParaRPr lang="en-US"/>
-          </a:p>
-        </p:txBody>
-      </p:sp>
-      <p:sp>
-        <p:nvSpPr>
-          <p:cNvPr id="9" name="Cloud Callout 8"/>
-          <p:cNvSpPr/>
-          <p:nvPr/>
-        </p:nvSpPr>
-        <p:spPr>
-          <a:xfrm>
-            <a:off x="762000" y="24882"/>
-            <a:ext cx="1143000" cy="658449"/>
-          </a:xfrm>
-          <a:prstGeom prst="cloudCallout">
-            <a:avLst>
-              <a:gd name="adj1" fmla="val 20328"/>
-              <a:gd name="adj2" fmla="val 97977"/>
-            </a:avLst>
-          </a:prstGeom>
-          <a:noFill/>
         </p:spPr>
         <p:style>
           <a:lnRef idx="2">
@@ -3710,9 +3567,1960 @@
           </p:txBody>
         </p:sp>
       </p:grpSp>
+      <p:sp>
+        <p:nvSpPr>
+          <p:cNvPr id="4" name="Freeform 3"/>
+          <p:cNvSpPr/>
+          <p:nvPr/>
+        </p:nvSpPr>
+        <p:spPr>
+          <a:xfrm>
+            <a:off x="985837" y="1447800"/>
+            <a:ext cx="285750" cy="242888"/>
+          </a:xfrm>
+          <a:custGeom>
+            <a:avLst/>
+            <a:gdLst>
+              <a:gd name="connsiteX0" fmla="*/ 0 w 285750"/>
+              <a:gd name="connsiteY0" fmla="*/ 0 h 242888"/>
+              <a:gd name="connsiteX1" fmla="*/ 133350 w 285750"/>
+              <a:gd name="connsiteY1" fmla="*/ 242888 h 242888"/>
+              <a:gd name="connsiteX2" fmla="*/ 285750 w 285750"/>
+              <a:gd name="connsiteY2" fmla="*/ 19050 h 242888"/>
+            </a:gdLst>
+            <a:ahLst/>
+            <a:cxnLst>
+              <a:cxn ang="0">
+                <a:pos x="connsiteX0" y="connsiteY0"/>
+              </a:cxn>
+              <a:cxn ang="0">
+                <a:pos x="connsiteX1" y="connsiteY1"/>
+              </a:cxn>
+              <a:cxn ang="0">
+                <a:pos x="connsiteX2" y="connsiteY2"/>
+              </a:cxn>
+            </a:cxnLst>
+            <a:rect l="l" t="t" r="r" b="b"/>
+            <a:pathLst>
+              <a:path w="285750" h="242888">
+                <a:moveTo>
+                  <a:pt x="0" y="0"/>
+                </a:moveTo>
+                <a:lnTo>
+                  <a:pt x="133350" y="242888"/>
+                </a:lnTo>
+                <a:lnTo>
+                  <a:pt x="285750" y="19050"/>
+                </a:lnTo>
+              </a:path>
+            </a:pathLst>
+          </a:custGeom>
+          <a:noFill/>
+          <a:ln w="38100">
+            <a:solidFill>
+              <a:schemeClr val="bg1">
+                <a:lumMod val="75000"/>
+              </a:schemeClr>
+            </a:solidFill>
+            <a:tailEnd type="none"/>
+          </a:ln>
+        </p:spPr>
+        <p:style>
+          <a:lnRef idx="2">
+            <a:schemeClr val="accent1">
+              <a:shade val="50000"/>
+            </a:schemeClr>
+          </a:lnRef>
+          <a:fillRef idx="1">
+            <a:schemeClr val="accent1"/>
+          </a:fillRef>
+          <a:effectRef idx="0">
+            <a:schemeClr val="accent1"/>
+          </a:effectRef>
+          <a:fontRef idx="minor">
+            <a:schemeClr val="lt1"/>
+          </a:fontRef>
+        </p:style>
+        <p:txBody>
+          <a:bodyPr rtlCol="0" anchor="ctr"/>
+          <a:lstStyle/>
+          <a:p>
+            <a:pPr algn="ctr"/>
+            <a:endParaRPr lang="en-SG"/>
+          </a:p>
+        </p:txBody>
+      </p:sp>
+      <p:sp>
+        <p:nvSpPr>
+          <p:cNvPr id="29" name="Freeform 13"/>
+          <p:cNvSpPr>
+            <a:spLocks/>
+          </p:cNvSpPr>
+          <p:nvPr/>
+        </p:nvSpPr>
+        <p:spPr bwMode="auto">
+          <a:xfrm>
+            <a:off x="2451100" y="654050"/>
+            <a:ext cx="365125" cy="635000"/>
+          </a:xfrm>
+          <a:custGeom>
+            <a:avLst/>
+            <a:gdLst>
+              <a:gd name="T0" fmla="*/ 36 w 230"/>
+              <a:gd name="T1" fmla="*/ 62 h 400"/>
+              <a:gd name="T2" fmla="*/ 36 w 230"/>
+              <a:gd name="T3" fmla="*/ 62 h 400"/>
+              <a:gd name="T4" fmla="*/ 34 w 230"/>
+              <a:gd name="T5" fmla="*/ 68 h 400"/>
+              <a:gd name="T6" fmla="*/ 32 w 230"/>
+              <a:gd name="T7" fmla="*/ 88 h 400"/>
+              <a:gd name="T8" fmla="*/ 30 w 230"/>
+              <a:gd name="T9" fmla="*/ 102 h 400"/>
+              <a:gd name="T10" fmla="*/ 32 w 230"/>
+              <a:gd name="T11" fmla="*/ 118 h 400"/>
+              <a:gd name="T12" fmla="*/ 32 w 230"/>
+              <a:gd name="T13" fmla="*/ 136 h 400"/>
+              <a:gd name="T14" fmla="*/ 36 w 230"/>
+              <a:gd name="T15" fmla="*/ 156 h 400"/>
+              <a:gd name="T16" fmla="*/ 42 w 230"/>
+              <a:gd name="T17" fmla="*/ 176 h 400"/>
+              <a:gd name="T18" fmla="*/ 50 w 230"/>
+              <a:gd name="T19" fmla="*/ 198 h 400"/>
+              <a:gd name="T20" fmla="*/ 62 w 230"/>
+              <a:gd name="T21" fmla="*/ 220 h 400"/>
+              <a:gd name="T22" fmla="*/ 78 w 230"/>
+              <a:gd name="T23" fmla="*/ 244 h 400"/>
+              <a:gd name="T24" fmla="*/ 98 w 230"/>
+              <a:gd name="T25" fmla="*/ 266 h 400"/>
+              <a:gd name="T26" fmla="*/ 122 w 230"/>
+              <a:gd name="T27" fmla="*/ 288 h 400"/>
+              <a:gd name="T28" fmla="*/ 152 w 230"/>
+              <a:gd name="T29" fmla="*/ 310 h 400"/>
+              <a:gd name="T30" fmla="*/ 186 w 230"/>
+              <a:gd name="T31" fmla="*/ 330 h 400"/>
+              <a:gd name="T32" fmla="*/ 186 w 230"/>
+              <a:gd name="T33" fmla="*/ 330 h 400"/>
+              <a:gd name="T34" fmla="*/ 198 w 230"/>
+              <a:gd name="T35" fmla="*/ 344 h 400"/>
+              <a:gd name="T36" fmla="*/ 220 w 230"/>
+              <a:gd name="T37" fmla="*/ 370 h 400"/>
+              <a:gd name="T38" fmla="*/ 228 w 230"/>
+              <a:gd name="T39" fmla="*/ 382 h 400"/>
+              <a:gd name="T40" fmla="*/ 230 w 230"/>
+              <a:gd name="T41" fmla="*/ 388 h 400"/>
+              <a:gd name="T42" fmla="*/ 230 w 230"/>
+              <a:gd name="T43" fmla="*/ 394 h 400"/>
+              <a:gd name="T44" fmla="*/ 228 w 230"/>
+              <a:gd name="T45" fmla="*/ 396 h 400"/>
+              <a:gd name="T46" fmla="*/ 226 w 230"/>
+              <a:gd name="T47" fmla="*/ 400 h 400"/>
+              <a:gd name="T48" fmla="*/ 220 w 230"/>
+              <a:gd name="T49" fmla="*/ 400 h 400"/>
+              <a:gd name="T50" fmla="*/ 210 w 230"/>
+              <a:gd name="T51" fmla="*/ 398 h 400"/>
+              <a:gd name="T52" fmla="*/ 210 w 230"/>
+              <a:gd name="T53" fmla="*/ 398 h 400"/>
+              <a:gd name="T54" fmla="*/ 202 w 230"/>
+              <a:gd name="T55" fmla="*/ 394 h 400"/>
+              <a:gd name="T56" fmla="*/ 176 w 230"/>
+              <a:gd name="T57" fmla="*/ 378 h 400"/>
+              <a:gd name="T58" fmla="*/ 142 w 230"/>
+              <a:gd name="T59" fmla="*/ 352 h 400"/>
+              <a:gd name="T60" fmla="*/ 122 w 230"/>
+              <a:gd name="T61" fmla="*/ 336 h 400"/>
+              <a:gd name="T62" fmla="*/ 102 w 230"/>
+              <a:gd name="T63" fmla="*/ 316 h 400"/>
+              <a:gd name="T64" fmla="*/ 82 w 230"/>
+              <a:gd name="T65" fmla="*/ 294 h 400"/>
+              <a:gd name="T66" fmla="*/ 62 w 230"/>
+              <a:gd name="T67" fmla="*/ 270 h 400"/>
+              <a:gd name="T68" fmla="*/ 46 w 230"/>
+              <a:gd name="T69" fmla="*/ 242 h 400"/>
+              <a:gd name="T70" fmla="*/ 30 w 230"/>
+              <a:gd name="T71" fmla="*/ 212 h 400"/>
+              <a:gd name="T72" fmla="*/ 18 w 230"/>
+              <a:gd name="T73" fmla="*/ 180 h 400"/>
+              <a:gd name="T74" fmla="*/ 8 w 230"/>
+              <a:gd name="T75" fmla="*/ 144 h 400"/>
+              <a:gd name="T76" fmla="*/ 4 w 230"/>
+              <a:gd name="T77" fmla="*/ 126 h 400"/>
+              <a:gd name="T78" fmla="*/ 4 w 230"/>
+              <a:gd name="T79" fmla="*/ 106 h 400"/>
+              <a:gd name="T80" fmla="*/ 2 w 230"/>
+              <a:gd name="T81" fmla="*/ 86 h 400"/>
+              <a:gd name="T82" fmla="*/ 2 w 230"/>
+              <a:gd name="T83" fmla="*/ 66 h 400"/>
+              <a:gd name="T84" fmla="*/ 2 w 230"/>
+              <a:gd name="T85" fmla="*/ 66 h 400"/>
+              <a:gd name="T86" fmla="*/ 0 w 230"/>
+              <a:gd name="T87" fmla="*/ 62 h 400"/>
+              <a:gd name="T88" fmla="*/ 0 w 230"/>
+              <a:gd name="T89" fmla="*/ 56 h 400"/>
+              <a:gd name="T90" fmla="*/ 2 w 230"/>
+              <a:gd name="T91" fmla="*/ 50 h 400"/>
+              <a:gd name="T92" fmla="*/ 2 w 230"/>
+              <a:gd name="T93" fmla="*/ 50 h 400"/>
+              <a:gd name="T94" fmla="*/ 4 w 230"/>
+              <a:gd name="T95" fmla="*/ 46 h 400"/>
+              <a:gd name="T96" fmla="*/ 10 w 230"/>
+              <a:gd name="T97" fmla="*/ 40 h 400"/>
+              <a:gd name="T98" fmla="*/ 10 w 230"/>
+              <a:gd name="T99" fmla="*/ 40 h 400"/>
+              <a:gd name="T100" fmla="*/ 14 w 230"/>
+              <a:gd name="T101" fmla="*/ 36 h 400"/>
+              <a:gd name="T102" fmla="*/ 20 w 230"/>
+              <a:gd name="T103" fmla="*/ 34 h 400"/>
+              <a:gd name="T104" fmla="*/ 20 w 230"/>
+              <a:gd name="T105" fmla="*/ 34 h 400"/>
+              <a:gd name="T106" fmla="*/ 20 w 230"/>
+              <a:gd name="T107" fmla="*/ 26 h 400"/>
+              <a:gd name="T108" fmla="*/ 22 w 230"/>
+              <a:gd name="T109" fmla="*/ 12 h 400"/>
+              <a:gd name="T110" fmla="*/ 22 w 230"/>
+              <a:gd name="T111" fmla="*/ 12 h 400"/>
+              <a:gd name="T112" fmla="*/ 26 w 230"/>
+              <a:gd name="T113" fmla="*/ 2 h 400"/>
+              <a:gd name="T114" fmla="*/ 28 w 230"/>
+              <a:gd name="T115" fmla="*/ 0 h 400"/>
+              <a:gd name="T116" fmla="*/ 30 w 230"/>
+              <a:gd name="T117" fmla="*/ 0 h 400"/>
+              <a:gd name="T118" fmla="*/ 32 w 230"/>
+              <a:gd name="T119" fmla="*/ 2 h 400"/>
+              <a:gd name="T120" fmla="*/ 34 w 230"/>
+              <a:gd name="T121" fmla="*/ 6 h 400"/>
+              <a:gd name="T122" fmla="*/ 34 w 230"/>
+              <a:gd name="T123" fmla="*/ 18 h 400"/>
+              <a:gd name="T124" fmla="*/ 34 w 230"/>
+              <a:gd name="T125" fmla="*/ 34 h 400"/>
+            </a:gdLst>
+            <a:ahLst/>
+            <a:cxnLst>
+              <a:cxn ang="0">
+                <a:pos x="T0" y="T1"/>
+              </a:cxn>
+              <a:cxn ang="0">
+                <a:pos x="T2" y="T3"/>
+              </a:cxn>
+              <a:cxn ang="0">
+                <a:pos x="T4" y="T5"/>
+              </a:cxn>
+              <a:cxn ang="0">
+                <a:pos x="T6" y="T7"/>
+              </a:cxn>
+              <a:cxn ang="0">
+                <a:pos x="T8" y="T9"/>
+              </a:cxn>
+              <a:cxn ang="0">
+                <a:pos x="T10" y="T11"/>
+              </a:cxn>
+              <a:cxn ang="0">
+                <a:pos x="T12" y="T13"/>
+              </a:cxn>
+              <a:cxn ang="0">
+                <a:pos x="T14" y="T15"/>
+              </a:cxn>
+              <a:cxn ang="0">
+                <a:pos x="T16" y="T17"/>
+              </a:cxn>
+              <a:cxn ang="0">
+                <a:pos x="T18" y="T19"/>
+              </a:cxn>
+              <a:cxn ang="0">
+                <a:pos x="T20" y="T21"/>
+              </a:cxn>
+              <a:cxn ang="0">
+                <a:pos x="T22" y="T23"/>
+              </a:cxn>
+              <a:cxn ang="0">
+                <a:pos x="T24" y="T25"/>
+              </a:cxn>
+              <a:cxn ang="0">
+                <a:pos x="T26" y="T27"/>
+              </a:cxn>
+              <a:cxn ang="0">
+                <a:pos x="T28" y="T29"/>
+              </a:cxn>
+              <a:cxn ang="0">
+                <a:pos x="T30" y="T31"/>
+              </a:cxn>
+              <a:cxn ang="0">
+                <a:pos x="T32" y="T33"/>
+              </a:cxn>
+              <a:cxn ang="0">
+                <a:pos x="T34" y="T35"/>
+              </a:cxn>
+              <a:cxn ang="0">
+                <a:pos x="T36" y="T37"/>
+              </a:cxn>
+              <a:cxn ang="0">
+                <a:pos x="T38" y="T39"/>
+              </a:cxn>
+              <a:cxn ang="0">
+                <a:pos x="T40" y="T41"/>
+              </a:cxn>
+              <a:cxn ang="0">
+                <a:pos x="T42" y="T43"/>
+              </a:cxn>
+              <a:cxn ang="0">
+                <a:pos x="T44" y="T45"/>
+              </a:cxn>
+              <a:cxn ang="0">
+                <a:pos x="T46" y="T47"/>
+              </a:cxn>
+              <a:cxn ang="0">
+                <a:pos x="T48" y="T49"/>
+              </a:cxn>
+              <a:cxn ang="0">
+                <a:pos x="T50" y="T51"/>
+              </a:cxn>
+              <a:cxn ang="0">
+                <a:pos x="T52" y="T53"/>
+              </a:cxn>
+              <a:cxn ang="0">
+                <a:pos x="T54" y="T55"/>
+              </a:cxn>
+              <a:cxn ang="0">
+                <a:pos x="T56" y="T57"/>
+              </a:cxn>
+              <a:cxn ang="0">
+                <a:pos x="T58" y="T59"/>
+              </a:cxn>
+              <a:cxn ang="0">
+                <a:pos x="T60" y="T61"/>
+              </a:cxn>
+              <a:cxn ang="0">
+                <a:pos x="T62" y="T63"/>
+              </a:cxn>
+              <a:cxn ang="0">
+                <a:pos x="T64" y="T65"/>
+              </a:cxn>
+              <a:cxn ang="0">
+                <a:pos x="T66" y="T67"/>
+              </a:cxn>
+              <a:cxn ang="0">
+                <a:pos x="T68" y="T69"/>
+              </a:cxn>
+              <a:cxn ang="0">
+                <a:pos x="T70" y="T71"/>
+              </a:cxn>
+              <a:cxn ang="0">
+                <a:pos x="T72" y="T73"/>
+              </a:cxn>
+              <a:cxn ang="0">
+                <a:pos x="T74" y="T75"/>
+              </a:cxn>
+              <a:cxn ang="0">
+                <a:pos x="T76" y="T77"/>
+              </a:cxn>
+              <a:cxn ang="0">
+                <a:pos x="T78" y="T79"/>
+              </a:cxn>
+              <a:cxn ang="0">
+                <a:pos x="T80" y="T81"/>
+              </a:cxn>
+              <a:cxn ang="0">
+                <a:pos x="T82" y="T83"/>
+              </a:cxn>
+              <a:cxn ang="0">
+                <a:pos x="T84" y="T85"/>
+              </a:cxn>
+              <a:cxn ang="0">
+                <a:pos x="T86" y="T87"/>
+              </a:cxn>
+              <a:cxn ang="0">
+                <a:pos x="T88" y="T89"/>
+              </a:cxn>
+              <a:cxn ang="0">
+                <a:pos x="T90" y="T91"/>
+              </a:cxn>
+              <a:cxn ang="0">
+                <a:pos x="T92" y="T93"/>
+              </a:cxn>
+              <a:cxn ang="0">
+                <a:pos x="T94" y="T95"/>
+              </a:cxn>
+              <a:cxn ang="0">
+                <a:pos x="T96" y="T97"/>
+              </a:cxn>
+              <a:cxn ang="0">
+                <a:pos x="T98" y="T99"/>
+              </a:cxn>
+              <a:cxn ang="0">
+                <a:pos x="T100" y="T101"/>
+              </a:cxn>
+              <a:cxn ang="0">
+                <a:pos x="T102" y="T103"/>
+              </a:cxn>
+              <a:cxn ang="0">
+                <a:pos x="T104" y="T105"/>
+              </a:cxn>
+              <a:cxn ang="0">
+                <a:pos x="T106" y="T107"/>
+              </a:cxn>
+              <a:cxn ang="0">
+                <a:pos x="T108" y="T109"/>
+              </a:cxn>
+              <a:cxn ang="0">
+                <a:pos x="T110" y="T111"/>
+              </a:cxn>
+              <a:cxn ang="0">
+                <a:pos x="T112" y="T113"/>
+              </a:cxn>
+              <a:cxn ang="0">
+                <a:pos x="T114" y="T115"/>
+              </a:cxn>
+              <a:cxn ang="0">
+                <a:pos x="T116" y="T117"/>
+              </a:cxn>
+              <a:cxn ang="0">
+                <a:pos x="T118" y="T119"/>
+              </a:cxn>
+              <a:cxn ang="0">
+                <a:pos x="T120" y="T121"/>
+              </a:cxn>
+              <a:cxn ang="0">
+                <a:pos x="T122" y="T123"/>
+              </a:cxn>
+              <a:cxn ang="0">
+                <a:pos x="T124" y="T125"/>
+              </a:cxn>
+            </a:cxnLst>
+            <a:rect l="0" t="0" r="r" b="b"/>
+            <a:pathLst>
+              <a:path w="230" h="400">
+                <a:moveTo>
+                  <a:pt x="36" y="62"/>
+                </a:moveTo>
+                <a:lnTo>
+                  <a:pt x="36" y="62"/>
+                </a:lnTo>
+                <a:lnTo>
+                  <a:pt x="34" y="68"/>
+                </a:lnTo>
+                <a:lnTo>
+                  <a:pt x="32" y="88"/>
+                </a:lnTo>
+                <a:lnTo>
+                  <a:pt x="30" y="102"/>
+                </a:lnTo>
+                <a:lnTo>
+                  <a:pt x="32" y="118"/>
+                </a:lnTo>
+                <a:lnTo>
+                  <a:pt x="32" y="136"/>
+                </a:lnTo>
+                <a:lnTo>
+                  <a:pt x="36" y="156"/>
+                </a:lnTo>
+                <a:lnTo>
+                  <a:pt x="42" y="176"/>
+                </a:lnTo>
+                <a:lnTo>
+                  <a:pt x="50" y="198"/>
+                </a:lnTo>
+                <a:lnTo>
+                  <a:pt x="62" y="220"/>
+                </a:lnTo>
+                <a:lnTo>
+                  <a:pt x="78" y="244"/>
+                </a:lnTo>
+                <a:lnTo>
+                  <a:pt x="98" y="266"/>
+                </a:lnTo>
+                <a:lnTo>
+                  <a:pt x="122" y="288"/>
+                </a:lnTo>
+                <a:lnTo>
+                  <a:pt x="152" y="310"/>
+                </a:lnTo>
+                <a:lnTo>
+                  <a:pt x="186" y="330"/>
+                </a:lnTo>
+                <a:lnTo>
+                  <a:pt x="186" y="330"/>
+                </a:lnTo>
+                <a:lnTo>
+                  <a:pt x="198" y="344"/>
+                </a:lnTo>
+                <a:lnTo>
+                  <a:pt x="220" y="370"/>
+                </a:lnTo>
+                <a:lnTo>
+                  <a:pt x="228" y="382"/>
+                </a:lnTo>
+                <a:lnTo>
+                  <a:pt x="230" y="388"/>
+                </a:lnTo>
+                <a:lnTo>
+                  <a:pt x="230" y="394"/>
+                </a:lnTo>
+                <a:lnTo>
+                  <a:pt x="228" y="396"/>
+                </a:lnTo>
+                <a:lnTo>
+                  <a:pt x="226" y="400"/>
+                </a:lnTo>
+                <a:lnTo>
+                  <a:pt x="220" y="400"/>
+                </a:lnTo>
+                <a:lnTo>
+                  <a:pt x="210" y="398"/>
+                </a:lnTo>
+                <a:lnTo>
+                  <a:pt x="210" y="398"/>
+                </a:lnTo>
+                <a:lnTo>
+                  <a:pt x="202" y="394"/>
+                </a:lnTo>
+                <a:lnTo>
+                  <a:pt x="176" y="378"/>
+                </a:lnTo>
+                <a:lnTo>
+                  <a:pt x="142" y="352"/>
+                </a:lnTo>
+                <a:lnTo>
+                  <a:pt x="122" y="336"/>
+                </a:lnTo>
+                <a:lnTo>
+                  <a:pt x="102" y="316"/>
+                </a:lnTo>
+                <a:lnTo>
+                  <a:pt x="82" y="294"/>
+                </a:lnTo>
+                <a:lnTo>
+                  <a:pt x="62" y="270"/>
+                </a:lnTo>
+                <a:lnTo>
+                  <a:pt x="46" y="242"/>
+                </a:lnTo>
+                <a:lnTo>
+                  <a:pt x="30" y="212"/>
+                </a:lnTo>
+                <a:lnTo>
+                  <a:pt x="18" y="180"/>
+                </a:lnTo>
+                <a:lnTo>
+                  <a:pt x="8" y="144"/>
+                </a:lnTo>
+                <a:lnTo>
+                  <a:pt x="4" y="126"/>
+                </a:lnTo>
+                <a:lnTo>
+                  <a:pt x="4" y="106"/>
+                </a:lnTo>
+                <a:lnTo>
+                  <a:pt x="2" y="86"/>
+                </a:lnTo>
+                <a:lnTo>
+                  <a:pt x="2" y="66"/>
+                </a:lnTo>
+                <a:lnTo>
+                  <a:pt x="2" y="66"/>
+                </a:lnTo>
+                <a:lnTo>
+                  <a:pt x="0" y="62"/>
+                </a:lnTo>
+                <a:lnTo>
+                  <a:pt x="0" y="56"/>
+                </a:lnTo>
+                <a:lnTo>
+                  <a:pt x="2" y="50"/>
+                </a:lnTo>
+                <a:lnTo>
+                  <a:pt x="2" y="50"/>
+                </a:lnTo>
+                <a:lnTo>
+                  <a:pt x="4" y="46"/>
+                </a:lnTo>
+                <a:lnTo>
+                  <a:pt x="10" y="40"/>
+                </a:lnTo>
+                <a:lnTo>
+                  <a:pt x="10" y="40"/>
+                </a:lnTo>
+                <a:lnTo>
+                  <a:pt x="14" y="36"/>
+                </a:lnTo>
+                <a:lnTo>
+                  <a:pt x="20" y="34"/>
+                </a:lnTo>
+                <a:lnTo>
+                  <a:pt x="20" y="34"/>
+                </a:lnTo>
+                <a:lnTo>
+                  <a:pt x="20" y="26"/>
+                </a:lnTo>
+                <a:lnTo>
+                  <a:pt x="22" y="12"/>
+                </a:lnTo>
+                <a:lnTo>
+                  <a:pt x="22" y="12"/>
+                </a:lnTo>
+                <a:lnTo>
+                  <a:pt x="26" y="2"/>
+                </a:lnTo>
+                <a:lnTo>
+                  <a:pt x="28" y="0"/>
+                </a:lnTo>
+                <a:lnTo>
+                  <a:pt x="30" y="0"/>
+                </a:lnTo>
+                <a:lnTo>
+                  <a:pt x="32" y="2"/>
+                </a:lnTo>
+                <a:lnTo>
+                  <a:pt x="34" y="6"/>
+                </a:lnTo>
+                <a:lnTo>
+                  <a:pt x="34" y="18"/>
+                </a:lnTo>
+                <a:lnTo>
+                  <a:pt x="34" y="34"/>
+                </a:lnTo>
+              </a:path>
+            </a:pathLst>
+          </a:custGeom>
+          <a:noFill/>
+          <a:ln>
+            <a:noFill/>
+          </a:ln>
+          <a:extLst>
+            <a:ext uri="{909E8E84-426E-40DD-AFC4-6F175D3DCCD1}">
+              <a14:hiddenFill xmlns:a14="http://schemas.microsoft.com/office/drawing/2010/main">
+                <a:solidFill>
+                  <a:srgbClr val="FFFFFF"/>
+                </a:solidFill>
+              </a14:hiddenFill>
+            </a:ext>
+            <a:ext uri="{91240B29-F687-4F45-9708-019B960494DF}">
+              <a14:hiddenLine xmlns:a14="http://schemas.microsoft.com/office/drawing/2010/main" w="9525">
+                <a:solidFill>
+                  <a:srgbClr val="000000"/>
+                </a:solidFill>
+                <a:round/>
+                <a:headEnd/>
+                <a:tailEnd/>
+              </a14:hiddenLine>
+            </a:ext>
+          </a:extLst>
+        </p:spPr>
+        <p:txBody>
+          <a:bodyPr vert="horz" wrap="square" lIns="91440" tIns="45720" rIns="91440" bIns="45720" numCol="1" anchor="t" anchorCtr="0" compatLnSpc="1">
+            <a:prstTxWarp prst="textNoShape">
+              <a:avLst/>
+            </a:prstTxWarp>
+          </a:bodyPr>
+          <a:lstStyle/>
+          <a:p>
+            <a:endParaRPr lang="en-SG"/>
+          </a:p>
+        </p:txBody>
+      </p:sp>
+      <p:sp>
+        <p:nvSpPr>
+          <p:cNvPr id="5" name="TextBox 4"/>
+          <p:cNvSpPr txBox="1"/>
+          <p:nvPr/>
+        </p:nvSpPr>
+        <p:spPr>
+          <a:xfrm>
+            <a:off x="609600" y="171319"/>
+            <a:ext cx="1981200" cy="1107996"/>
+          </a:xfrm>
+          <a:prstGeom prst="rect">
+            <a:avLst/>
+          </a:prstGeom>
+          <a:noFill/>
+        </p:spPr>
+        <p:txBody>
+          <a:bodyPr wrap="square" rtlCol="0">
+            <a:spAutoFit/>
+          </a:bodyPr>
+          <a:lstStyle/>
+          <a:p>
+            <a:r>
+              <a:rPr lang="en-US" sz="6600" dirty="0" smtClean="0">
+                <a:solidFill>
+                  <a:srgbClr val="0070C0"/>
+                </a:solidFill>
+                <a:latin typeface="Times New Roman" panose="02020603050405020304" pitchFamily="18" charset="0"/>
+                <a:cs typeface="Times New Roman" panose="02020603050405020304" pitchFamily="18" charset="0"/>
+              </a:rPr>
+              <a:t>“    ”</a:t>
+            </a:r>
+            <a:endParaRPr lang="en-US" sz="6600" dirty="0">
+              <a:solidFill>
+                <a:srgbClr val="0070C0"/>
+              </a:solidFill>
+              <a:latin typeface="Times New Roman" panose="02020603050405020304" pitchFamily="18" charset="0"/>
+              <a:cs typeface="Times New Roman" panose="02020603050405020304" pitchFamily="18" charset="0"/>
+            </a:endParaRPr>
+          </a:p>
+        </p:txBody>
+      </p:sp>
       <p:grpSp>
         <p:nvGrpSpPr>
-          <p:cNvPr id="19" name="Group 18"/>
+          <p:cNvPr id="6" name="Group 5"/>
+          <p:cNvGrpSpPr/>
+          <p:nvPr/>
+        </p:nvGrpSpPr>
+        <p:grpSpPr>
+          <a:xfrm flipH="1">
+            <a:off x="1546832" y="929481"/>
+            <a:ext cx="739168" cy="790543"/>
+            <a:chOff x="1324570" y="929481"/>
+            <a:chExt cx="739168" cy="790543"/>
+          </a:xfrm>
+        </p:grpSpPr>
+        <p:grpSp>
+          <p:nvGrpSpPr>
+            <p:cNvPr id="67" name="[Group 18]"/>
+            <p:cNvGrpSpPr/>
+            <p:nvPr/>
+          </p:nvGrpSpPr>
+          <p:grpSpPr>
+            <a:xfrm flipH="1">
+              <a:off x="1600199" y="929481"/>
+              <a:ext cx="463539" cy="790543"/>
+              <a:chOff x="699777" y="319219"/>
+              <a:chExt cx="298983" cy="520531"/>
+            </a:xfrm>
+            <a:solidFill>
+              <a:schemeClr val="bg1"/>
+            </a:solidFill>
+          </p:grpSpPr>
+          <p:sp>
+            <p:nvSpPr>
+              <p:cNvPr id="68" name="Flowchart: Connector 67"/>
+              <p:cNvSpPr/>
+              <p:nvPr/>
+            </p:nvSpPr>
+            <p:spPr>
+              <a:xfrm>
+                <a:off x="738937" y="319219"/>
+                <a:ext cx="220662" cy="220662"/>
+              </a:xfrm>
+              <a:prstGeom prst="flowChartConnector">
+                <a:avLst/>
+              </a:prstGeom>
+              <a:noFill/>
+              <a:ln w="38100">
+                <a:solidFill>
+                  <a:schemeClr val="bg1">
+                    <a:lumMod val="75000"/>
+                  </a:schemeClr>
+                </a:solidFill>
+                <a:tailEnd type="none"/>
+              </a:ln>
+            </p:spPr>
+            <p:style>
+              <a:lnRef idx="2">
+                <a:schemeClr val="accent1">
+                  <a:shade val="50000"/>
+                </a:schemeClr>
+              </a:lnRef>
+              <a:fillRef idx="1">
+                <a:schemeClr val="accent1"/>
+              </a:fillRef>
+              <a:effectRef idx="0">
+                <a:schemeClr val="accent1"/>
+              </a:effectRef>
+              <a:fontRef idx="minor">
+                <a:schemeClr val="lt1"/>
+              </a:fontRef>
+            </p:style>
+            <p:txBody>
+              <a:bodyPr rtlCol="0" anchor="ctr"/>
+              <a:lstStyle/>
+              <a:p>
+                <a:pPr algn="ctr"/>
+                <a:endParaRPr lang="en-SG"/>
+              </a:p>
+            </p:txBody>
+          </p:sp>
+          <p:sp>
+            <p:nvSpPr>
+              <p:cNvPr id="69" name="Flowchart: Delay 68"/>
+              <p:cNvSpPr/>
+              <p:nvPr/>
+            </p:nvSpPr>
+            <p:spPr>
+              <a:xfrm rot="16200000">
+                <a:off x="709092" y="550082"/>
+                <a:ext cx="280353" cy="298983"/>
+              </a:xfrm>
+              <a:prstGeom prst="flowChartDelay">
+                <a:avLst/>
+              </a:prstGeom>
+              <a:noFill/>
+              <a:ln w="38100">
+                <a:solidFill>
+                  <a:schemeClr val="bg1">
+                    <a:lumMod val="75000"/>
+                  </a:schemeClr>
+                </a:solidFill>
+                <a:tailEnd type="none"/>
+              </a:ln>
+            </p:spPr>
+            <p:style>
+              <a:lnRef idx="2">
+                <a:schemeClr val="accent1">
+                  <a:shade val="50000"/>
+                </a:schemeClr>
+              </a:lnRef>
+              <a:fillRef idx="1">
+                <a:schemeClr val="accent1"/>
+              </a:fillRef>
+              <a:effectRef idx="0">
+                <a:schemeClr val="accent1"/>
+              </a:effectRef>
+              <a:fontRef idx="minor">
+                <a:schemeClr val="lt1"/>
+              </a:fontRef>
+            </p:style>
+            <p:txBody>
+              <a:bodyPr rtlCol="0" anchor="ctr"/>
+              <a:lstStyle/>
+              <a:p>
+                <a:pPr algn="ctr"/>
+                <a:endParaRPr lang="en-SG"/>
+              </a:p>
+            </p:txBody>
+          </p:sp>
+          <p:sp>
+            <p:nvSpPr>
+              <p:cNvPr id="70" name="Freeform 69"/>
+              <p:cNvSpPr/>
+              <p:nvPr/>
+            </p:nvSpPr>
+            <p:spPr>
+              <a:xfrm>
+                <a:off x="943388" y="479408"/>
+                <a:ext cx="50006" cy="19050"/>
+              </a:xfrm>
+              <a:custGeom>
+                <a:avLst/>
+                <a:gdLst>
+                  <a:gd name="connsiteX0" fmla="*/ 0 w 50006"/>
+                  <a:gd name="connsiteY0" fmla="*/ 0 h 19050"/>
+                  <a:gd name="connsiteX1" fmla="*/ 0 w 50006"/>
+                  <a:gd name="connsiteY1" fmla="*/ 0 h 19050"/>
+                  <a:gd name="connsiteX2" fmla="*/ 21431 w 50006"/>
+                  <a:gd name="connsiteY2" fmla="*/ 4762 h 19050"/>
+                  <a:gd name="connsiteX3" fmla="*/ 28575 w 50006"/>
+                  <a:gd name="connsiteY3" fmla="*/ 9525 h 19050"/>
+                  <a:gd name="connsiteX4" fmla="*/ 38100 w 50006"/>
+                  <a:gd name="connsiteY4" fmla="*/ 14287 h 19050"/>
+                  <a:gd name="connsiteX5" fmla="*/ 50006 w 50006"/>
+                  <a:gd name="connsiteY5" fmla="*/ 19050 h 19050"/>
+                </a:gdLst>
+                <a:ahLst/>
+                <a:cxnLst>
+                  <a:cxn ang="0">
+                    <a:pos x="connsiteX0" y="connsiteY0"/>
+                  </a:cxn>
+                  <a:cxn ang="0">
+                    <a:pos x="connsiteX1" y="connsiteY1"/>
+                  </a:cxn>
+                  <a:cxn ang="0">
+                    <a:pos x="connsiteX2" y="connsiteY2"/>
+                  </a:cxn>
+                  <a:cxn ang="0">
+                    <a:pos x="connsiteX3" y="connsiteY3"/>
+                  </a:cxn>
+                  <a:cxn ang="0">
+                    <a:pos x="connsiteX4" y="connsiteY4"/>
+                  </a:cxn>
+                  <a:cxn ang="0">
+                    <a:pos x="connsiteX5" y="connsiteY5"/>
+                  </a:cxn>
+                </a:cxnLst>
+                <a:rect l="l" t="t" r="r" b="b"/>
+                <a:pathLst>
+                  <a:path w="50006" h="19050">
+                    <a:moveTo>
+                      <a:pt x="0" y="0"/>
+                    </a:moveTo>
+                    <a:lnTo>
+                      <a:pt x="0" y="0"/>
+                    </a:lnTo>
+                    <a:cubicBezTo>
+                      <a:pt x="7144" y="1587"/>
+                      <a:pt x="14489" y="2448"/>
+                      <a:pt x="21431" y="4762"/>
+                    </a:cubicBezTo>
+                    <a:cubicBezTo>
+                      <a:pt x="24146" y="5667"/>
+                      <a:pt x="26090" y="8105"/>
+                      <a:pt x="28575" y="9525"/>
+                    </a:cubicBezTo>
+                    <a:cubicBezTo>
+                      <a:pt x="31657" y="11286"/>
+                      <a:pt x="34837" y="12889"/>
+                      <a:pt x="38100" y="14287"/>
+                    </a:cubicBezTo>
+                    <a:cubicBezTo>
+                      <a:pt x="58672" y="23103"/>
+                      <a:pt x="34691" y="11391"/>
+                      <a:pt x="50006" y="19050"/>
+                    </a:cubicBezTo>
+                  </a:path>
+                </a:pathLst>
+              </a:custGeom>
+              <a:noFill/>
+              <a:ln w="38100">
+                <a:solidFill>
+                  <a:schemeClr val="bg1">
+                    <a:lumMod val="75000"/>
+                  </a:schemeClr>
+                </a:solidFill>
+                <a:tailEnd type="none"/>
+              </a:ln>
+            </p:spPr>
+            <p:style>
+              <a:lnRef idx="2">
+                <a:schemeClr val="accent1">
+                  <a:shade val="50000"/>
+                </a:schemeClr>
+              </a:lnRef>
+              <a:fillRef idx="1">
+                <a:schemeClr val="accent1"/>
+              </a:fillRef>
+              <a:effectRef idx="0">
+                <a:schemeClr val="accent1"/>
+              </a:effectRef>
+              <a:fontRef idx="minor">
+                <a:schemeClr val="lt1"/>
+              </a:fontRef>
+            </p:style>
+            <p:txBody>
+              <a:bodyPr rtlCol="0" anchor="ctr"/>
+              <a:lstStyle/>
+              <a:p>
+                <a:pPr algn="ctr"/>
+                <a:endParaRPr lang="en-SG"/>
+              </a:p>
+            </p:txBody>
+          </p:sp>
+          <p:sp>
+            <p:nvSpPr>
+              <p:cNvPr id="71" name="Flowchart: Connector 70"/>
+              <p:cNvSpPr/>
+              <p:nvPr/>
+            </p:nvSpPr>
+            <p:spPr>
+              <a:xfrm flipH="1">
+                <a:off x="851649" y="373837"/>
+                <a:ext cx="45719" cy="45719"/>
+              </a:xfrm>
+              <a:prstGeom prst="flowChartConnector">
+                <a:avLst/>
+              </a:prstGeom>
+              <a:noFill/>
+              <a:ln w="38100">
+                <a:solidFill>
+                  <a:schemeClr val="bg1">
+                    <a:lumMod val="75000"/>
+                  </a:schemeClr>
+                </a:solidFill>
+                <a:tailEnd type="none"/>
+              </a:ln>
+            </p:spPr>
+            <p:style>
+              <a:lnRef idx="2">
+                <a:schemeClr val="accent1">
+                  <a:shade val="50000"/>
+                </a:schemeClr>
+              </a:lnRef>
+              <a:fillRef idx="1">
+                <a:schemeClr val="accent1"/>
+              </a:fillRef>
+              <a:effectRef idx="0">
+                <a:schemeClr val="accent1"/>
+              </a:effectRef>
+              <a:fontRef idx="minor">
+                <a:schemeClr val="lt1"/>
+              </a:fontRef>
+            </p:style>
+            <p:txBody>
+              <a:bodyPr rtlCol="0" anchor="ctr"/>
+              <a:lstStyle/>
+              <a:p>
+                <a:pPr algn="ctr"/>
+                <a:endParaRPr lang="en-SG"/>
+              </a:p>
+            </p:txBody>
+          </p:sp>
+        </p:grpSp>
+        <p:sp>
+          <p:nvSpPr>
+            <p:cNvPr id="72" name="[Freeform 23]"/>
+            <p:cNvSpPr/>
+            <p:nvPr/>
+          </p:nvSpPr>
+          <p:spPr>
+            <a:xfrm flipH="1">
+              <a:off x="1324570" y="1450705"/>
+              <a:ext cx="285750" cy="242888"/>
+            </a:xfrm>
+            <a:custGeom>
+              <a:avLst/>
+              <a:gdLst>
+                <a:gd name="connsiteX0" fmla="*/ 0 w 285750"/>
+                <a:gd name="connsiteY0" fmla="*/ 0 h 242888"/>
+                <a:gd name="connsiteX1" fmla="*/ 133350 w 285750"/>
+                <a:gd name="connsiteY1" fmla="*/ 242888 h 242888"/>
+                <a:gd name="connsiteX2" fmla="*/ 285750 w 285750"/>
+                <a:gd name="connsiteY2" fmla="*/ 19050 h 242888"/>
+              </a:gdLst>
+              <a:ahLst/>
+              <a:cxnLst>
+                <a:cxn ang="0">
+                  <a:pos x="connsiteX0" y="connsiteY0"/>
+                </a:cxn>
+                <a:cxn ang="0">
+                  <a:pos x="connsiteX1" y="connsiteY1"/>
+                </a:cxn>
+                <a:cxn ang="0">
+                  <a:pos x="connsiteX2" y="connsiteY2"/>
+                </a:cxn>
+              </a:cxnLst>
+              <a:rect l="l" t="t" r="r" b="b"/>
+              <a:pathLst>
+                <a:path w="285750" h="242888">
+                  <a:moveTo>
+                    <a:pt x="0" y="0"/>
+                  </a:moveTo>
+                  <a:lnTo>
+                    <a:pt x="133350" y="242888"/>
+                  </a:lnTo>
+                  <a:lnTo>
+                    <a:pt x="285750" y="19050"/>
+                  </a:lnTo>
+                </a:path>
+              </a:pathLst>
+            </a:custGeom>
+            <a:noFill/>
+            <a:ln w="38100">
+              <a:solidFill>
+                <a:schemeClr val="bg1">
+                  <a:lumMod val="75000"/>
+                </a:schemeClr>
+              </a:solidFill>
+              <a:tailEnd type="none"/>
+            </a:ln>
+          </p:spPr>
+          <p:style>
+            <a:lnRef idx="2">
+              <a:schemeClr val="accent1">
+                <a:shade val="50000"/>
+              </a:schemeClr>
+            </a:lnRef>
+            <a:fillRef idx="1">
+              <a:schemeClr val="accent1"/>
+            </a:fillRef>
+            <a:effectRef idx="0">
+              <a:schemeClr val="accent1"/>
+            </a:effectRef>
+            <a:fontRef idx="minor">
+              <a:schemeClr val="lt1"/>
+            </a:fontRef>
+          </p:style>
+          <p:txBody>
+            <a:bodyPr rtlCol="0" anchor="ctr"/>
+            <a:lstStyle/>
+            <a:p>
+              <a:pPr algn="ctr"/>
+              <a:endParaRPr lang="en-SG"/>
+            </a:p>
+          </p:txBody>
+        </p:sp>
+      </p:grpSp>
+      <p:cxnSp>
+        <p:nvCxnSpPr>
+          <p:cNvPr id="8" name="Straight Connector 7"/>
+          <p:cNvCxnSpPr/>
+          <p:nvPr/>
+        </p:nvCxnSpPr>
+        <p:spPr>
+          <a:xfrm>
+            <a:off x="1235504" y="1380103"/>
+            <a:ext cx="0" cy="76200"/>
+          </a:xfrm>
+          <a:prstGeom prst="line">
+            <a:avLst/>
+          </a:prstGeom>
+          <a:ln w="38100" cap="rnd">
+            <a:solidFill>
+              <a:schemeClr val="bg1">
+                <a:lumMod val="75000"/>
+              </a:schemeClr>
+            </a:solidFill>
+          </a:ln>
+        </p:spPr>
+        <p:style>
+          <a:lnRef idx="1">
+            <a:schemeClr val="accent1"/>
+          </a:lnRef>
+          <a:fillRef idx="0">
+            <a:schemeClr val="accent1"/>
+          </a:fillRef>
+          <a:effectRef idx="0">
+            <a:schemeClr val="accent1"/>
+          </a:effectRef>
+          <a:fontRef idx="minor">
+            <a:schemeClr val="tx1"/>
+          </a:fontRef>
+        </p:style>
+      </p:cxnSp>
+      <p:sp>
+        <p:nvSpPr>
+          <p:cNvPr id="25" name="Rounded Rectangle 24"/>
+          <p:cNvSpPr/>
+          <p:nvPr/>
+        </p:nvSpPr>
+        <p:spPr>
+          <a:xfrm>
+            <a:off x="1216562" y="1427720"/>
+            <a:ext cx="113929" cy="111362"/>
+          </a:xfrm>
+          <a:prstGeom prst="roundRect">
+            <a:avLst/>
+          </a:prstGeom>
+          <a:solidFill>
+            <a:schemeClr val="bg1">
+              <a:lumMod val="75000"/>
+            </a:schemeClr>
+          </a:solidFill>
+          <a:ln>
+            <a:noFill/>
+          </a:ln>
+        </p:spPr>
+        <p:style>
+          <a:lnRef idx="2">
+            <a:schemeClr val="accent1">
+              <a:shade val="50000"/>
+            </a:schemeClr>
+          </a:lnRef>
+          <a:fillRef idx="1">
+            <a:schemeClr val="accent1"/>
+          </a:fillRef>
+          <a:effectRef idx="0">
+            <a:schemeClr val="accent1"/>
+          </a:effectRef>
+          <a:fontRef idx="minor">
+            <a:schemeClr val="lt1"/>
+          </a:fontRef>
+        </p:style>
+        <p:txBody>
+          <a:bodyPr rtlCol="0" anchor="ctr"/>
+          <a:lstStyle/>
+          <a:p>
+            <a:pPr algn="ctr"/>
+            <a:endParaRPr lang="en-US"/>
+          </a:p>
+        </p:txBody>
+      </p:sp>
+      <p:cxnSp>
+        <p:nvCxnSpPr>
+          <p:cNvPr id="77" name="Straight Connector 76"/>
+          <p:cNvCxnSpPr/>
+          <p:nvPr/>
+        </p:nvCxnSpPr>
+        <p:spPr>
+          <a:xfrm>
+            <a:off x="2267213" y="1349940"/>
+            <a:ext cx="0" cy="76200"/>
+          </a:xfrm>
+          <a:prstGeom prst="line">
+            <a:avLst/>
+          </a:prstGeom>
+          <a:ln w="38100" cap="rnd">
+            <a:solidFill>
+              <a:schemeClr val="bg1">
+                <a:lumMod val="75000"/>
+              </a:schemeClr>
+            </a:solidFill>
+          </a:ln>
+        </p:spPr>
+        <p:style>
+          <a:lnRef idx="1">
+            <a:schemeClr val="accent1"/>
+          </a:lnRef>
+          <a:fillRef idx="0">
+            <a:schemeClr val="accent1"/>
+          </a:fillRef>
+          <a:effectRef idx="0">
+            <a:schemeClr val="accent1"/>
+          </a:effectRef>
+          <a:fontRef idx="minor">
+            <a:schemeClr val="tx1"/>
+          </a:fontRef>
+        </p:style>
+      </p:cxnSp>
+      <p:sp>
+        <p:nvSpPr>
+          <p:cNvPr id="78" name="Rounded Rectangle 77"/>
+          <p:cNvSpPr/>
+          <p:nvPr/>
+        </p:nvSpPr>
+        <p:spPr>
+          <a:xfrm>
+            <a:off x="2248271" y="1397557"/>
+            <a:ext cx="113929" cy="111362"/>
+          </a:xfrm>
+          <a:prstGeom prst="roundRect">
+            <a:avLst/>
+          </a:prstGeom>
+          <a:solidFill>
+            <a:schemeClr val="bg1">
+              <a:lumMod val="75000"/>
+            </a:schemeClr>
+          </a:solidFill>
+          <a:ln>
+            <a:noFill/>
+          </a:ln>
+        </p:spPr>
+        <p:style>
+          <a:lnRef idx="2">
+            <a:schemeClr val="accent1">
+              <a:shade val="50000"/>
+            </a:schemeClr>
+          </a:lnRef>
+          <a:fillRef idx="1">
+            <a:schemeClr val="accent1"/>
+          </a:fillRef>
+          <a:effectRef idx="0">
+            <a:schemeClr val="accent1"/>
+          </a:effectRef>
+          <a:fontRef idx="minor">
+            <a:schemeClr val="lt1"/>
+          </a:fontRef>
+        </p:style>
+        <p:txBody>
+          <a:bodyPr rtlCol="0" anchor="ctr"/>
+          <a:lstStyle/>
+          <a:p>
+            <a:pPr algn="ctr"/>
+            <a:endParaRPr lang="en-US"/>
+          </a:p>
+        </p:txBody>
+      </p:sp>
+      <p:sp>
+        <p:nvSpPr>
+          <p:cNvPr id="26" name="[Freeform 25]"/>
+          <p:cNvSpPr/>
+          <p:nvPr/>
+        </p:nvSpPr>
+        <p:spPr>
+          <a:xfrm>
+            <a:off x="1333499" y="327378"/>
+            <a:ext cx="387585" cy="306681"/>
+          </a:xfrm>
+          <a:custGeom>
+            <a:avLst/>
+            <a:gdLst>
+              <a:gd name="connsiteX0" fmla="*/ 0 w 387585"/>
+              <a:gd name="connsiteY0" fmla="*/ 184385 h 306681"/>
+              <a:gd name="connsiteX1" fmla="*/ 82785 w 387585"/>
+              <a:gd name="connsiteY1" fmla="*/ 306681 h 306681"/>
+              <a:gd name="connsiteX2" fmla="*/ 387585 w 387585"/>
+              <a:gd name="connsiteY2" fmla="*/ 0 h 306681"/>
+            </a:gdLst>
+            <a:ahLst/>
+            <a:cxnLst>
+              <a:cxn ang="0">
+                <a:pos x="connsiteX0" y="connsiteY0"/>
+              </a:cxn>
+              <a:cxn ang="0">
+                <a:pos x="connsiteX1" y="connsiteY1"/>
+              </a:cxn>
+              <a:cxn ang="0">
+                <a:pos x="connsiteX2" y="connsiteY2"/>
+              </a:cxn>
+            </a:cxnLst>
+            <a:rect l="l" t="t" r="r" b="b"/>
+            <a:pathLst>
+              <a:path w="387585" h="306681">
+                <a:moveTo>
+                  <a:pt x="0" y="184385"/>
+                </a:moveTo>
+                <a:lnTo>
+                  <a:pt x="82785" y="306681"/>
+                </a:lnTo>
+                <a:lnTo>
+                  <a:pt x="387585" y="0"/>
+                </a:lnTo>
+              </a:path>
+            </a:pathLst>
+          </a:custGeom>
+          <a:noFill/>
+          <a:ln w="76200" cap="rnd">
+            <a:solidFill>
+              <a:schemeClr val="accent6">
+                <a:lumMod val="75000"/>
+              </a:schemeClr>
+            </a:solidFill>
+          </a:ln>
+        </p:spPr>
+        <p:style>
+          <a:lnRef idx="2">
+            <a:schemeClr val="accent1">
+              <a:shade val="50000"/>
+            </a:schemeClr>
+          </a:lnRef>
+          <a:fillRef idx="1">
+            <a:schemeClr val="accent1"/>
+          </a:fillRef>
+          <a:effectRef idx="0">
+            <a:schemeClr val="accent1"/>
+          </a:effectRef>
+          <a:fontRef idx="minor">
+            <a:schemeClr val="lt1"/>
+          </a:fontRef>
+        </p:style>
+        <p:txBody>
+          <a:bodyPr rtlCol="0" anchor="ctr"/>
+          <a:lstStyle/>
+          <a:p>
+            <a:pPr algn="ctr"/>
+            <a:endParaRPr lang="en-US"/>
+          </a:p>
+        </p:txBody>
+      </p:sp>
+    </p:spTree>
+    <p:extLst>
+      <p:ext uri="{BB962C8B-B14F-4D97-AF65-F5344CB8AC3E}">
+        <p14:creationId xmlns:p14="http://schemas.microsoft.com/office/powerpoint/2010/main" val="1589420437"/>
+      </p:ext>
+    </p:extLst>
+  </p:cSld>
+  <p:clrMapOvr>
+    <a:masterClrMapping/>
+  </p:clrMapOvr>
+  <p:timing>
+    <p:tnLst>
+      <p:par>
+        <p:cTn id="1" dur="indefinite" restart="never" nodeType="tmRoot"/>
+      </p:par>
+    </p:tnLst>
+  </p:timing>
+</p:sld>
+</file>
+
+<file path=ppt/slides/slide2.xml><?xml version="1.0" encoding="utf-8"?>
+<p:sld xmlns:a="http://schemas.openxmlformats.org/drawingml/2006/main" xmlns:r="http://schemas.openxmlformats.org/officeDocument/2006/relationships" xmlns:p="http://schemas.openxmlformats.org/presentationml/2006/main">
+  <p:cSld>
+    <p:spTree>
+      <p:nvGrpSpPr>
+        <p:cNvPr id="1" name=""/>
+        <p:cNvGrpSpPr/>
+        <p:nvPr/>
+      </p:nvGrpSpPr>
+      <p:grpSpPr>
+        <a:xfrm>
+          <a:off x="0" y="0"/>
+          <a:ext cx="0" cy="0"/>
+          <a:chOff x="0" y="0"/>
+          <a:chExt cx="0" cy="0"/>
+        </a:xfrm>
+      </p:grpSpPr>
+      <p:sp>
+        <p:nvSpPr>
+          <p:cNvPr id="11" name="Cloud Callout 10"/>
+          <p:cNvSpPr/>
+          <p:nvPr/>
+        </p:nvSpPr>
+        <p:spPr>
+          <a:xfrm>
+            <a:off x="609600" y="-61119"/>
+            <a:ext cx="1447799" cy="744451"/>
+          </a:xfrm>
+          <a:prstGeom prst="cloudCallout">
+            <a:avLst>
+              <a:gd name="adj1" fmla="val -24485"/>
+              <a:gd name="adj2" fmla="val 99222"/>
+            </a:avLst>
+          </a:prstGeom>
+          <a:solidFill>
+            <a:schemeClr val="bg1"/>
+          </a:solidFill>
+          <a:ln>
+            <a:solidFill>
+              <a:schemeClr val="bg1"/>
+            </a:solidFill>
+          </a:ln>
+          <a:effectLst>
+            <a:softEdge rad="31750"/>
+          </a:effectLst>
+        </p:spPr>
+        <p:style>
+          <a:lnRef idx="2">
+            <a:schemeClr val="accent1">
+              <a:shade val="50000"/>
+            </a:schemeClr>
+          </a:lnRef>
+          <a:fillRef idx="1">
+            <a:schemeClr val="accent1"/>
+          </a:fillRef>
+          <a:effectRef idx="0">
+            <a:schemeClr val="accent1"/>
+          </a:effectRef>
+          <a:fontRef idx="minor">
+            <a:schemeClr val="lt1"/>
+          </a:fontRef>
+        </p:style>
+        <p:txBody>
+          <a:bodyPr rtlCol="0" anchor="ctr"/>
+          <a:lstStyle/>
+          <a:p>
+            <a:pPr algn="ctr"/>
+            <a:endParaRPr lang="en-US"/>
+          </a:p>
+        </p:txBody>
+      </p:sp>
+      <p:sp>
+        <p:nvSpPr>
+          <p:cNvPr id="12" name="Cloud Callout 11"/>
+          <p:cNvSpPr/>
+          <p:nvPr/>
+        </p:nvSpPr>
+        <p:spPr>
+          <a:xfrm>
+            <a:off x="609600" y="-23968"/>
+            <a:ext cx="1447799" cy="707300"/>
+          </a:xfrm>
+          <a:prstGeom prst="cloudCallout">
+            <a:avLst>
+              <a:gd name="adj1" fmla="val 20328"/>
+              <a:gd name="adj2" fmla="val 97977"/>
+            </a:avLst>
+          </a:prstGeom>
+          <a:noFill/>
+          <a:ln>
+            <a:solidFill>
+              <a:schemeClr val="bg1"/>
+            </a:solidFill>
+          </a:ln>
+          <a:effectLst>
+            <a:softEdge rad="31750"/>
+          </a:effectLst>
+        </p:spPr>
+        <p:style>
+          <a:lnRef idx="2">
+            <a:schemeClr val="accent1">
+              <a:shade val="50000"/>
+            </a:schemeClr>
+          </a:lnRef>
+          <a:fillRef idx="1">
+            <a:schemeClr val="accent1"/>
+          </a:fillRef>
+          <a:effectRef idx="0">
+            <a:schemeClr val="accent1"/>
+          </a:effectRef>
+          <a:fontRef idx="minor">
+            <a:schemeClr val="lt1"/>
+          </a:fontRef>
+        </p:style>
+        <p:txBody>
+          <a:bodyPr rtlCol="0" anchor="ctr"/>
+          <a:lstStyle/>
+          <a:p>
+            <a:pPr algn="ctr"/>
+            <a:endParaRPr lang="en-US"/>
+          </a:p>
+        </p:txBody>
+      </p:sp>
+      <p:sp>
+        <p:nvSpPr>
+          <p:cNvPr id="2" name="Cloud Callout 1"/>
+          <p:cNvSpPr/>
+          <p:nvPr/>
+        </p:nvSpPr>
+        <p:spPr>
+          <a:xfrm>
+            <a:off x="762000" y="24883"/>
+            <a:ext cx="1143000" cy="658448"/>
+          </a:xfrm>
+          <a:prstGeom prst="cloudCallout">
+            <a:avLst>
+              <a:gd name="adj1" fmla="val -24485"/>
+              <a:gd name="adj2" fmla="val 99222"/>
+            </a:avLst>
+          </a:prstGeom>
+          <a:solidFill>
+            <a:schemeClr val="bg1"/>
+          </a:solidFill>
+        </p:spPr>
+        <p:style>
+          <a:lnRef idx="2">
+            <a:schemeClr val="accent1">
+              <a:shade val="50000"/>
+            </a:schemeClr>
+          </a:lnRef>
+          <a:fillRef idx="1">
+            <a:schemeClr val="accent1"/>
+          </a:fillRef>
+          <a:effectRef idx="0">
+            <a:schemeClr val="accent1"/>
+          </a:effectRef>
+          <a:fontRef idx="minor">
+            <a:schemeClr val="lt1"/>
+          </a:fontRef>
+        </p:style>
+        <p:txBody>
+          <a:bodyPr rtlCol="0" anchor="ctr"/>
+          <a:lstStyle/>
+          <a:p>
+            <a:pPr algn="ctr"/>
+            <a:endParaRPr lang="en-US"/>
+          </a:p>
+        </p:txBody>
+      </p:sp>
+      <p:sp>
+        <p:nvSpPr>
+          <p:cNvPr id="9" name="Cloud Callout 8"/>
+          <p:cNvSpPr/>
+          <p:nvPr/>
+        </p:nvSpPr>
+        <p:spPr>
+          <a:xfrm>
+            <a:off x="762000" y="24882"/>
+            <a:ext cx="1143000" cy="658449"/>
+          </a:xfrm>
+          <a:prstGeom prst="cloudCallout">
+            <a:avLst>
+              <a:gd name="adj1" fmla="val 20328"/>
+              <a:gd name="adj2" fmla="val 97977"/>
+            </a:avLst>
+          </a:prstGeom>
+          <a:noFill/>
+        </p:spPr>
+        <p:style>
+          <a:lnRef idx="2">
+            <a:schemeClr val="accent1">
+              <a:shade val="50000"/>
+            </a:schemeClr>
+          </a:lnRef>
+          <a:fillRef idx="1">
+            <a:schemeClr val="accent1"/>
+          </a:fillRef>
+          <a:effectRef idx="0">
+            <a:schemeClr val="accent1"/>
+          </a:effectRef>
+          <a:fontRef idx="minor">
+            <a:schemeClr val="lt1"/>
+          </a:fontRef>
+        </p:style>
+        <p:txBody>
+          <a:bodyPr rtlCol="0" anchor="ctr"/>
+          <a:lstStyle/>
+          <a:p>
+            <a:pPr algn="ctr"/>
+            <a:endParaRPr lang="en-US"/>
+          </a:p>
+        </p:txBody>
+      </p:sp>
+      <p:grpSp>
+        <p:nvGrpSpPr>
+          <p:cNvPr id="10" name="Group 9"/>
+          <p:cNvGrpSpPr/>
+          <p:nvPr/>
+        </p:nvGrpSpPr>
+        <p:grpSpPr>
+          <a:xfrm>
+            <a:off x="533400" y="926506"/>
+            <a:ext cx="463536" cy="793282"/>
+            <a:chOff x="638861" y="309422"/>
+            <a:chExt cx="298983" cy="520531"/>
+          </a:xfrm>
+        </p:grpSpPr>
+        <p:sp>
+          <p:nvSpPr>
+            <p:cNvPr id="13" name="Flowchart: Connector 12"/>
+            <p:cNvSpPr/>
+            <p:nvPr/>
+          </p:nvSpPr>
+          <p:spPr>
+            <a:xfrm>
+              <a:off x="678021" y="309422"/>
+              <a:ext cx="220662" cy="220662"/>
+            </a:xfrm>
+            <a:prstGeom prst="flowChartConnector">
+              <a:avLst/>
+            </a:prstGeom>
+            <a:solidFill>
+              <a:schemeClr val="bg1"/>
+            </a:solidFill>
+            <a:ln w="38100">
+              <a:solidFill>
+                <a:schemeClr val="bg1">
+                  <a:lumMod val="75000"/>
+                </a:schemeClr>
+              </a:solidFill>
+            </a:ln>
+          </p:spPr>
+          <p:style>
+            <a:lnRef idx="2">
+              <a:schemeClr val="accent1">
+                <a:shade val="50000"/>
+              </a:schemeClr>
+            </a:lnRef>
+            <a:fillRef idx="1">
+              <a:schemeClr val="accent1"/>
+            </a:fillRef>
+            <a:effectRef idx="0">
+              <a:schemeClr val="accent1"/>
+            </a:effectRef>
+            <a:fontRef idx="minor">
+              <a:schemeClr val="lt1"/>
+            </a:fontRef>
+          </p:style>
+          <p:txBody>
+            <a:bodyPr rtlCol="0" anchor="ctr"/>
+            <a:lstStyle/>
+            <a:p>
+              <a:pPr algn="ctr"/>
+              <a:endParaRPr lang="en-SG"/>
+            </a:p>
+          </p:txBody>
+        </p:sp>
+        <p:grpSp>
+          <p:nvGrpSpPr>
+            <p:cNvPr id="14" name="Group 13"/>
+            <p:cNvGrpSpPr/>
+            <p:nvPr/>
+          </p:nvGrpSpPr>
+          <p:grpSpPr>
+            <a:xfrm>
+              <a:off x="638861" y="549600"/>
+              <a:ext cx="298983" cy="280353"/>
+              <a:chOff x="638861" y="549600"/>
+              <a:chExt cx="298983" cy="280353"/>
+            </a:xfrm>
+          </p:grpSpPr>
+          <p:sp>
+            <p:nvSpPr>
+              <p:cNvPr id="17" name="Flowchart: Delay 16"/>
+              <p:cNvSpPr/>
+              <p:nvPr/>
+            </p:nvSpPr>
+            <p:spPr>
+              <a:xfrm rot="16200000">
+                <a:off x="648176" y="540285"/>
+                <a:ext cx="280353" cy="298983"/>
+              </a:xfrm>
+              <a:prstGeom prst="flowChartDelay">
+                <a:avLst/>
+              </a:prstGeom>
+              <a:solidFill>
+                <a:schemeClr val="bg1"/>
+              </a:solidFill>
+              <a:ln w="38100">
+                <a:solidFill>
+                  <a:schemeClr val="bg1">
+                    <a:lumMod val="75000"/>
+                  </a:schemeClr>
+                </a:solidFill>
+              </a:ln>
+            </p:spPr>
+            <p:style>
+              <a:lnRef idx="2">
+                <a:schemeClr val="accent1">
+                  <a:shade val="50000"/>
+                </a:schemeClr>
+              </a:lnRef>
+              <a:fillRef idx="1">
+                <a:schemeClr val="accent1"/>
+              </a:fillRef>
+              <a:effectRef idx="0">
+                <a:schemeClr val="accent1"/>
+              </a:effectRef>
+              <a:fontRef idx="minor">
+                <a:schemeClr val="lt1"/>
+              </a:fontRef>
+            </p:style>
+            <p:txBody>
+              <a:bodyPr rtlCol="0" anchor="ctr"/>
+              <a:lstStyle/>
+              <a:p>
+                <a:pPr algn="ctr"/>
+                <a:endParaRPr lang="en-SG"/>
+              </a:p>
+            </p:txBody>
+          </p:sp>
+          <p:sp>
+            <p:nvSpPr>
+              <p:cNvPr id="18" name="Freeform 17"/>
+              <p:cNvSpPr/>
+              <p:nvPr/>
+            </p:nvSpPr>
+            <p:spPr>
+              <a:xfrm>
+                <a:off x="737215" y="552954"/>
+                <a:ext cx="102393" cy="235744"/>
+              </a:xfrm>
+              <a:custGeom>
+                <a:avLst/>
+                <a:gdLst>
+                  <a:gd name="connsiteX0" fmla="*/ 47625 w 102393"/>
+                  <a:gd name="connsiteY0" fmla="*/ 0 h 235744"/>
+                  <a:gd name="connsiteX1" fmla="*/ 0 w 102393"/>
+                  <a:gd name="connsiteY1" fmla="*/ 185738 h 235744"/>
+                  <a:gd name="connsiteX2" fmla="*/ 57150 w 102393"/>
+                  <a:gd name="connsiteY2" fmla="*/ 235744 h 235744"/>
+                  <a:gd name="connsiteX3" fmla="*/ 102393 w 102393"/>
+                  <a:gd name="connsiteY3" fmla="*/ 171450 h 235744"/>
+                  <a:gd name="connsiteX4" fmla="*/ 47625 w 102393"/>
+                  <a:gd name="connsiteY4" fmla="*/ 0 h 235744"/>
+                </a:gdLst>
+                <a:ahLst/>
+                <a:cxnLst>
+                  <a:cxn ang="0">
+                    <a:pos x="connsiteX0" y="connsiteY0"/>
+                  </a:cxn>
+                  <a:cxn ang="0">
+                    <a:pos x="connsiteX1" y="connsiteY1"/>
+                  </a:cxn>
+                  <a:cxn ang="0">
+                    <a:pos x="connsiteX2" y="connsiteY2"/>
+                  </a:cxn>
+                  <a:cxn ang="0">
+                    <a:pos x="connsiteX3" y="connsiteY3"/>
+                  </a:cxn>
+                  <a:cxn ang="0">
+                    <a:pos x="connsiteX4" y="connsiteY4"/>
+                  </a:cxn>
+                </a:cxnLst>
+                <a:rect l="l" t="t" r="r" b="b"/>
+                <a:pathLst>
+                  <a:path w="102393" h="235744">
+                    <a:moveTo>
+                      <a:pt x="47625" y="0"/>
+                    </a:moveTo>
+                    <a:lnTo>
+                      <a:pt x="0" y="185738"/>
+                    </a:lnTo>
+                    <a:lnTo>
+                      <a:pt x="57150" y="235744"/>
+                    </a:lnTo>
+                    <a:lnTo>
+                      <a:pt x="102393" y="171450"/>
+                    </a:lnTo>
+                    <a:lnTo>
+                      <a:pt x="47625" y="0"/>
+                    </a:lnTo>
+                    <a:close/>
+                  </a:path>
+                </a:pathLst>
+              </a:custGeom>
+              <a:solidFill>
+                <a:schemeClr val="bg1"/>
+              </a:solidFill>
+              <a:ln w="38100">
+                <a:solidFill>
+                  <a:schemeClr val="bg1">
+                    <a:lumMod val="75000"/>
+                  </a:schemeClr>
+                </a:solidFill>
+              </a:ln>
+            </p:spPr>
+            <p:style>
+              <a:lnRef idx="2">
+                <a:schemeClr val="accent1">
+                  <a:shade val="50000"/>
+                </a:schemeClr>
+              </a:lnRef>
+              <a:fillRef idx="1">
+                <a:schemeClr val="accent1"/>
+              </a:fillRef>
+              <a:effectRef idx="0">
+                <a:schemeClr val="accent1"/>
+              </a:effectRef>
+              <a:fontRef idx="minor">
+                <a:schemeClr val="lt1"/>
+              </a:fontRef>
+            </p:style>
+            <p:txBody>
+              <a:bodyPr rtlCol="0" anchor="ctr"/>
+              <a:lstStyle/>
+              <a:p>
+                <a:pPr algn="ctr"/>
+                <a:endParaRPr lang="en-SG"/>
+              </a:p>
+            </p:txBody>
+          </p:sp>
+        </p:grpSp>
+        <p:sp>
+          <p:nvSpPr>
+            <p:cNvPr id="15" name="Freeform 14"/>
+            <p:cNvSpPr/>
+            <p:nvPr/>
+          </p:nvSpPr>
+          <p:spPr>
+            <a:xfrm>
+              <a:off x="882472" y="469611"/>
+              <a:ext cx="50006" cy="19050"/>
+            </a:xfrm>
+            <a:custGeom>
+              <a:avLst/>
+              <a:gdLst>
+                <a:gd name="connsiteX0" fmla="*/ 0 w 50006"/>
+                <a:gd name="connsiteY0" fmla="*/ 0 h 19050"/>
+                <a:gd name="connsiteX1" fmla="*/ 0 w 50006"/>
+                <a:gd name="connsiteY1" fmla="*/ 0 h 19050"/>
+                <a:gd name="connsiteX2" fmla="*/ 21431 w 50006"/>
+                <a:gd name="connsiteY2" fmla="*/ 4762 h 19050"/>
+                <a:gd name="connsiteX3" fmla="*/ 28575 w 50006"/>
+                <a:gd name="connsiteY3" fmla="*/ 9525 h 19050"/>
+                <a:gd name="connsiteX4" fmla="*/ 38100 w 50006"/>
+                <a:gd name="connsiteY4" fmla="*/ 14287 h 19050"/>
+                <a:gd name="connsiteX5" fmla="*/ 50006 w 50006"/>
+                <a:gd name="connsiteY5" fmla="*/ 19050 h 19050"/>
+              </a:gdLst>
+              <a:ahLst/>
+              <a:cxnLst>
+                <a:cxn ang="0">
+                  <a:pos x="connsiteX0" y="connsiteY0"/>
+                </a:cxn>
+                <a:cxn ang="0">
+                  <a:pos x="connsiteX1" y="connsiteY1"/>
+                </a:cxn>
+                <a:cxn ang="0">
+                  <a:pos x="connsiteX2" y="connsiteY2"/>
+                </a:cxn>
+                <a:cxn ang="0">
+                  <a:pos x="connsiteX3" y="connsiteY3"/>
+                </a:cxn>
+                <a:cxn ang="0">
+                  <a:pos x="connsiteX4" y="connsiteY4"/>
+                </a:cxn>
+                <a:cxn ang="0">
+                  <a:pos x="connsiteX5" y="connsiteY5"/>
+                </a:cxn>
+              </a:cxnLst>
+              <a:rect l="l" t="t" r="r" b="b"/>
+              <a:pathLst>
+                <a:path w="50006" h="19050">
+                  <a:moveTo>
+                    <a:pt x="0" y="0"/>
+                  </a:moveTo>
+                  <a:lnTo>
+                    <a:pt x="0" y="0"/>
+                  </a:lnTo>
+                  <a:cubicBezTo>
+                    <a:pt x="7144" y="1587"/>
+                    <a:pt x="14489" y="2448"/>
+                    <a:pt x="21431" y="4762"/>
+                  </a:cubicBezTo>
+                  <a:cubicBezTo>
+                    <a:pt x="24146" y="5667"/>
+                    <a:pt x="26090" y="8105"/>
+                    <a:pt x="28575" y="9525"/>
+                  </a:cubicBezTo>
+                  <a:cubicBezTo>
+                    <a:pt x="31657" y="11286"/>
+                    <a:pt x="34837" y="12889"/>
+                    <a:pt x="38100" y="14287"/>
+                  </a:cubicBezTo>
+                  <a:cubicBezTo>
+                    <a:pt x="58672" y="23103"/>
+                    <a:pt x="34691" y="11391"/>
+                    <a:pt x="50006" y="19050"/>
+                  </a:cubicBezTo>
+                </a:path>
+              </a:pathLst>
+            </a:custGeom>
+            <a:solidFill>
+              <a:schemeClr val="bg1"/>
+            </a:solidFill>
+            <a:ln w="38100">
+              <a:solidFill>
+                <a:schemeClr val="bg1">
+                  <a:lumMod val="75000"/>
+                </a:schemeClr>
+              </a:solidFill>
+            </a:ln>
+          </p:spPr>
+          <p:style>
+            <a:lnRef idx="2">
+              <a:schemeClr val="accent1">
+                <a:shade val="50000"/>
+              </a:schemeClr>
+            </a:lnRef>
+            <a:fillRef idx="1">
+              <a:schemeClr val="accent1"/>
+            </a:fillRef>
+            <a:effectRef idx="0">
+              <a:schemeClr val="accent1"/>
+            </a:effectRef>
+            <a:fontRef idx="minor">
+              <a:schemeClr val="lt1"/>
+            </a:fontRef>
+          </p:style>
+          <p:txBody>
+            <a:bodyPr rtlCol="0" anchor="ctr"/>
+            <a:lstStyle/>
+            <a:p>
+              <a:pPr algn="ctr"/>
+              <a:endParaRPr lang="en-SG"/>
+            </a:p>
+          </p:txBody>
+        </p:sp>
+        <p:sp>
+          <p:nvSpPr>
+            <p:cNvPr id="16" name="Flowchart: Connector 15"/>
+            <p:cNvSpPr/>
+            <p:nvPr/>
+          </p:nvSpPr>
+          <p:spPr>
+            <a:xfrm>
+              <a:off x="800257" y="354516"/>
+              <a:ext cx="45719" cy="45719"/>
+            </a:xfrm>
+            <a:prstGeom prst="flowChartConnector">
+              <a:avLst/>
+            </a:prstGeom>
+            <a:solidFill>
+              <a:schemeClr val="bg1"/>
+            </a:solidFill>
+            <a:ln w="38100">
+              <a:solidFill>
+                <a:schemeClr val="bg1">
+                  <a:lumMod val="75000"/>
+                </a:schemeClr>
+              </a:solidFill>
+            </a:ln>
+          </p:spPr>
+          <p:style>
+            <a:lnRef idx="2">
+              <a:schemeClr val="accent1">
+                <a:shade val="50000"/>
+              </a:schemeClr>
+            </a:lnRef>
+            <a:fillRef idx="1">
+              <a:schemeClr val="accent1"/>
+            </a:fillRef>
+            <a:effectRef idx="0">
+              <a:schemeClr val="accent1"/>
+            </a:effectRef>
+            <a:fontRef idx="minor">
+              <a:schemeClr val="lt1"/>
+            </a:fontRef>
+          </p:style>
+          <p:txBody>
+            <a:bodyPr rtlCol="0" anchor="ctr"/>
+            <a:lstStyle/>
+            <a:p>
+              <a:pPr algn="ctr"/>
+              <a:endParaRPr lang="en-SG"/>
+            </a:p>
+          </p:txBody>
+        </p:sp>
+      </p:grpSp>
+      <p:grpSp>
+        <p:nvGrpSpPr>
+          <p:cNvPr id="19" name="[Group 18]"/>
           <p:cNvGrpSpPr/>
           <p:nvPr/>
         </p:nvGrpSpPr>
@@ -4073,7 +5881,7 @@
       </p:sp>
       <p:sp>
         <p:nvSpPr>
-          <p:cNvPr id="24" name="Freeform 23"/>
+          <p:cNvPr id="24" name="[Freeform 23]"/>
           <p:cNvSpPr/>
           <p:nvPr/>
         </p:nvSpPr>
@@ -7638,7 +9446,7 @@
     </p:spTree>
     <p:extLst>
       <p:ext uri="{BB962C8B-B14F-4D97-AF65-F5344CB8AC3E}">
-        <p14:creationId xmlns:p14="http://schemas.microsoft.com/office/powerpoint/2010/main" val="1589420437"/>
+        <p14:creationId xmlns:p14="http://schemas.microsoft.com/office/powerpoint/2010/main" val="956169262"/>
       </p:ext>
     </p:extLst>
   </p:cSld>
@@ -7655,7 +9463,7 @@
 </p:sld>
 </file>
 
-<file path=ppt/slides/slide2.xml><?xml version="1.0" encoding="utf-8"?>
+<file path=ppt/slides/slide3.xml><?xml version="1.0" encoding="utf-8"?>
 <p:sld xmlns:a="http://schemas.openxmlformats.org/drawingml/2006/main" xmlns:r="http://schemas.openxmlformats.org/officeDocument/2006/relationships" xmlns:p="http://schemas.openxmlformats.org/presentationml/2006/main">
   <p:cSld>
     <p:spTree>
@@ -8195,7 +10003,7 @@
 </p:sld>
 </file>
 
-<file path=ppt/slides/slide3.xml><?xml version="1.0" encoding="utf-8"?>
+<file path=ppt/slides/slide4.xml><?xml version="1.0" encoding="utf-8"?>
 <p:sld xmlns:a="http://schemas.openxmlformats.org/drawingml/2006/main" xmlns:r="http://schemas.openxmlformats.org/officeDocument/2006/relationships" xmlns:p="http://schemas.openxmlformats.org/presentationml/2006/main">
   <p:cSld>
     <p:spTree>
@@ -8886,7 +10694,7 @@
 </p:sld>
 </file>
 
-<file path=ppt/slides/slide4.xml><?xml version="1.0" encoding="utf-8"?>
+<file path=ppt/slides/slide5.xml><?xml version="1.0" encoding="utf-8"?>
 <p:sld xmlns:a="http://schemas.openxmlformats.org/drawingml/2006/main" xmlns:r="http://schemas.openxmlformats.org/officeDocument/2006/relationships" xmlns:p="http://schemas.openxmlformats.org/presentationml/2006/main">
   <p:cSld>
     <p:spTree>
@@ -9914,7 +11722,7 @@
 </p:sld>
 </file>
 
-<file path=ppt/slides/slide5.xml><?xml version="1.0" encoding="utf-8"?>
+<file path=ppt/slides/slide6.xml><?xml version="1.0" encoding="utf-8"?>
 <p:sld xmlns:a="http://schemas.openxmlformats.org/drawingml/2006/main" xmlns:r="http://schemas.openxmlformats.org/officeDocument/2006/relationships" xmlns:p="http://schemas.openxmlformats.org/presentationml/2006/main">
   <p:cSld>
     <p:spTree>
@@ -10144,7 +11952,7 @@
 </p:sld>
 </file>
 
-<file path=ppt/slides/slide6.xml><?xml version="1.0" encoding="utf-8"?>
+<file path=ppt/slides/slide7.xml><?xml version="1.0" encoding="utf-8"?>
 <p:sld xmlns:a="http://schemas.openxmlformats.org/drawingml/2006/main" xmlns:r="http://schemas.openxmlformats.org/officeDocument/2006/relationships" xmlns:p="http://schemas.openxmlformats.org/presentationml/2006/main">
   <p:cSld>
     <p:spTree>

</xml_diff>

<commit_message>
Updated images in the homepage
</commit_message>
<xml_diff>
--- a/doc/mockups/InfoBytes.pptx
+++ b/doc/mockups/InfoBytes.pptx
@@ -295,7 +295,7 @@
             <a:fld id="{1D8BD707-D9CF-40AE-B4C6-C98DA3205C09}" type="datetimeFigureOut">
               <a:rPr lang="en-US" smtClean="0"/>
               <a:pPr/>
-              <a:t>4/5/2014</a:t>
+              <a:t>7/28/2014</a:t>
             </a:fld>
             <a:endParaRPr lang="en-US"/>
           </a:p>
@@ -515,7 +515,7 @@
             <a:fld id="{1D8BD707-D9CF-40AE-B4C6-C98DA3205C09}" type="datetimeFigureOut">
               <a:rPr lang="en-US" smtClean="0"/>
               <a:pPr/>
-              <a:t>4/5/2014</a:t>
+              <a:t>7/28/2014</a:t>
             </a:fld>
             <a:endParaRPr lang="en-US"/>
           </a:p>
@@ -692,7 +692,7 @@
             <a:fld id="{1D8BD707-D9CF-40AE-B4C6-C98DA3205C09}" type="datetimeFigureOut">
               <a:rPr lang="en-US" smtClean="0"/>
               <a:pPr/>
-              <a:t>4/5/2014</a:t>
+              <a:t>7/28/2014</a:t>
             </a:fld>
             <a:endParaRPr lang="en-US"/>
           </a:p>
@@ -859,7 +859,7 @@
             <a:fld id="{1D8BD707-D9CF-40AE-B4C6-C98DA3205C09}" type="datetimeFigureOut">
               <a:rPr lang="en-US" smtClean="0"/>
               <a:pPr/>
-              <a:t>4/5/2014</a:t>
+              <a:t>7/28/2014</a:t>
             </a:fld>
             <a:endParaRPr lang="en-US"/>
           </a:p>
@@ -1102,7 +1102,7 @@
             <a:fld id="{1D8BD707-D9CF-40AE-B4C6-C98DA3205C09}" type="datetimeFigureOut">
               <a:rPr lang="en-US" smtClean="0"/>
               <a:pPr/>
-              <a:t>4/5/2014</a:t>
+              <a:t>7/28/2014</a:t>
             </a:fld>
             <a:endParaRPr lang="en-US"/>
           </a:p>
@@ -1387,7 +1387,7 @@
             <a:fld id="{1D8BD707-D9CF-40AE-B4C6-C98DA3205C09}" type="datetimeFigureOut">
               <a:rPr lang="en-US" smtClean="0"/>
               <a:pPr/>
-              <a:t>4/5/2014</a:t>
+              <a:t>7/28/2014</a:t>
             </a:fld>
             <a:endParaRPr lang="en-US"/>
           </a:p>
@@ -1806,7 +1806,7 @@
             <a:fld id="{1D8BD707-D9CF-40AE-B4C6-C98DA3205C09}" type="datetimeFigureOut">
               <a:rPr lang="en-US" smtClean="0"/>
               <a:pPr/>
-              <a:t>4/5/2014</a:t>
+              <a:t>7/28/2014</a:t>
             </a:fld>
             <a:endParaRPr lang="en-US"/>
           </a:p>
@@ -1921,7 +1921,7 @@
             <a:fld id="{1D8BD707-D9CF-40AE-B4C6-C98DA3205C09}" type="datetimeFigureOut">
               <a:rPr lang="en-US" smtClean="0"/>
               <a:pPr/>
-              <a:t>4/5/2014</a:t>
+              <a:t>7/28/2014</a:t>
             </a:fld>
             <a:endParaRPr lang="en-US"/>
           </a:p>
@@ -2013,7 +2013,7 @@
             <a:fld id="{1D8BD707-D9CF-40AE-B4C6-C98DA3205C09}" type="datetimeFigureOut">
               <a:rPr lang="en-US" smtClean="0"/>
               <a:pPr/>
-              <a:t>4/5/2014</a:t>
+              <a:t>7/28/2014</a:t>
             </a:fld>
             <a:endParaRPr lang="en-US"/>
           </a:p>
@@ -2287,7 +2287,7 @@
             <a:fld id="{1D8BD707-D9CF-40AE-B4C6-C98DA3205C09}" type="datetimeFigureOut">
               <a:rPr lang="en-US" smtClean="0"/>
               <a:pPr/>
-              <a:t>4/5/2014</a:t>
+              <a:t>7/28/2014</a:t>
             </a:fld>
             <a:endParaRPr lang="en-US"/>
           </a:p>
@@ -2537,7 +2537,7 @@
             <a:fld id="{1D8BD707-D9CF-40AE-B4C6-C98DA3205C09}" type="datetimeFigureOut">
               <a:rPr lang="en-US" smtClean="0"/>
               <a:pPr/>
-              <a:t>4/5/2014</a:t>
+              <a:t>7/28/2014</a:t>
             </a:fld>
             <a:endParaRPr lang="en-US"/>
           </a:p>
@@ -2747,7 +2747,7 @@
             <a:fld id="{1D8BD707-D9CF-40AE-B4C6-C98DA3205C09}" type="datetimeFigureOut">
               <a:rPr lang="en-US" smtClean="0"/>
               <a:pPr/>
-              <a:t>4/5/2014</a:t>
+              <a:t>7/28/2014</a:t>
             </a:fld>
             <a:endParaRPr lang="en-US"/>
           </a:p>
@@ -9962,7 +9962,7 @@
           <a:p>
             <a:pPr lvl="0"/>
             <a:r>
-              <a:rPr lang="en-US" sz="5400" b="1" spc="50" dirty="0">
+              <a:rPr lang="en-US" sz="5400" b="1" spc="50" dirty="0" smtClean="0">
                 <a:ln w="11430"/>
                 <a:solidFill>
                   <a:schemeClr val="accent6">
@@ -9970,7 +9970,7 @@
                   </a:schemeClr>
                 </a:solidFill>
               </a:rPr>
-              <a:t>4</a:t>
+              <a:t>5</a:t>
             </a:r>
             <a:endParaRPr lang="en-SG" sz="5400" b="1" spc="50" dirty="0">
               <a:ln w="11430"/>

</xml_diff>

<commit_message>
Added 'award winning' to index.html
</commit_message>
<xml_diff>
--- a/doc/mockups/InfoBytes.pptx
+++ b/doc/mockups/InfoBytes.pptx
@@ -8,10 +8,11 @@
     <p:sldId id="257" r:id="rId2"/>
     <p:sldId id="264" r:id="rId3"/>
     <p:sldId id="263" r:id="rId4"/>
-    <p:sldId id="259" r:id="rId5"/>
-    <p:sldId id="260" r:id="rId6"/>
-    <p:sldId id="261" r:id="rId7"/>
-    <p:sldId id="262" r:id="rId8"/>
+    <p:sldId id="265" r:id="rId5"/>
+    <p:sldId id="259" r:id="rId6"/>
+    <p:sldId id="260" r:id="rId7"/>
+    <p:sldId id="261" r:id="rId8"/>
+    <p:sldId id="262" r:id="rId9"/>
   </p:sldIdLst>
   <p:sldSz cx="2743200" cy="2011363"/>
   <p:notesSz cx="6858000" cy="9144000"/>
@@ -295,7 +296,7 @@
             <a:fld id="{1D8BD707-D9CF-40AE-B4C6-C98DA3205C09}" type="datetimeFigureOut">
               <a:rPr lang="en-US" smtClean="0"/>
               <a:pPr/>
-              <a:t>7/28/2014</a:t>
+              <a:t>2/15/2015</a:t>
             </a:fld>
             <a:endParaRPr lang="en-US"/>
           </a:p>
@@ -515,7 +516,7 @@
             <a:fld id="{1D8BD707-D9CF-40AE-B4C6-C98DA3205C09}" type="datetimeFigureOut">
               <a:rPr lang="en-US" smtClean="0"/>
               <a:pPr/>
-              <a:t>7/28/2014</a:t>
+              <a:t>2/15/2015</a:t>
             </a:fld>
             <a:endParaRPr lang="en-US"/>
           </a:p>
@@ -692,7 +693,7 @@
             <a:fld id="{1D8BD707-D9CF-40AE-B4C6-C98DA3205C09}" type="datetimeFigureOut">
               <a:rPr lang="en-US" smtClean="0"/>
               <a:pPr/>
-              <a:t>7/28/2014</a:t>
+              <a:t>2/15/2015</a:t>
             </a:fld>
             <a:endParaRPr lang="en-US"/>
           </a:p>
@@ -859,7 +860,7 @@
             <a:fld id="{1D8BD707-D9CF-40AE-B4C6-C98DA3205C09}" type="datetimeFigureOut">
               <a:rPr lang="en-US" smtClean="0"/>
               <a:pPr/>
-              <a:t>7/28/2014</a:t>
+              <a:t>2/15/2015</a:t>
             </a:fld>
             <a:endParaRPr lang="en-US"/>
           </a:p>
@@ -1102,7 +1103,7 @@
             <a:fld id="{1D8BD707-D9CF-40AE-B4C6-C98DA3205C09}" type="datetimeFigureOut">
               <a:rPr lang="en-US" smtClean="0"/>
               <a:pPr/>
-              <a:t>7/28/2014</a:t>
+              <a:t>2/15/2015</a:t>
             </a:fld>
             <a:endParaRPr lang="en-US"/>
           </a:p>
@@ -1387,7 +1388,7 @@
             <a:fld id="{1D8BD707-D9CF-40AE-B4C6-C98DA3205C09}" type="datetimeFigureOut">
               <a:rPr lang="en-US" smtClean="0"/>
               <a:pPr/>
-              <a:t>7/28/2014</a:t>
+              <a:t>2/15/2015</a:t>
             </a:fld>
             <a:endParaRPr lang="en-US"/>
           </a:p>
@@ -1806,7 +1807,7 @@
             <a:fld id="{1D8BD707-D9CF-40AE-B4C6-C98DA3205C09}" type="datetimeFigureOut">
               <a:rPr lang="en-US" smtClean="0"/>
               <a:pPr/>
-              <a:t>7/28/2014</a:t>
+              <a:t>2/15/2015</a:t>
             </a:fld>
             <a:endParaRPr lang="en-US"/>
           </a:p>
@@ -1921,7 +1922,7 @@
             <a:fld id="{1D8BD707-D9CF-40AE-B4C6-C98DA3205C09}" type="datetimeFigureOut">
               <a:rPr lang="en-US" smtClean="0"/>
               <a:pPr/>
-              <a:t>7/28/2014</a:t>
+              <a:t>2/15/2015</a:t>
             </a:fld>
             <a:endParaRPr lang="en-US"/>
           </a:p>
@@ -2013,7 +2014,7 @@
             <a:fld id="{1D8BD707-D9CF-40AE-B4C6-C98DA3205C09}" type="datetimeFigureOut">
               <a:rPr lang="en-US" smtClean="0"/>
               <a:pPr/>
-              <a:t>7/28/2014</a:t>
+              <a:t>2/15/2015</a:t>
             </a:fld>
             <a:endParaRPr lang="en-US"/>
           </a:p>
@@ -2287,7 +2288,7 @@
             <a:fld id="{1D8BD707-D9CF-40AE-B4C6-C98DA3205C09}" type="datetimeFigureOut">
               <a:rPr lang="en-US" smtClean="0"/>
               <a:pPr/>
-              <a:t>7/28/2014</a:t>
+              <a:t>2/15/2015</a:t>
             </a:fld>
             <a:endParaRPr lang="en-US"/>
           </a:p>
@@ -2537,7 +2538,7 @@
             <a:fld id="{1D8BD707-D9CF-40AE-B4C6-C98DA3205C09}" type="datetimeFigureOut">
               <a:rPr lang="en-US" smtClean="0"/>
               <a:pPr/>
-              <a:t>7/28/2014</a:t>
+              <a:t>2/15/2015</a:t>
             </a:fld>
             <a:endParaRPr lang="en-US"/>
           </a:p>
@@ -2747,7 +2748,7 @@
             <a:fld id="{1D8BD707-D9CF-40AE-B4C6-C98DA3205C09}" type="datetimeFigureOut">
               <a:rPr lang="en-US" smtClean="0"/>
               <a:pPr/>
-              <a:t>7/28/2014</a:t>
+              <a:t>2/15/2015</a:t>
             </a:fld>
             <a:endParaRPr lang="en-US"/>
           </a:p>
@@ -10020,6 +10021,1524 @@
           <a:chExt cx="0" cy="0"/>
         </a:xfrm>
       </p:grpSpPr>
+      <p:grpSp>
+        <p:nvGrpSpPr>
+          <p:cNvPr id="29" name="Group 28"/>
+          <p:cNvGrpSpPr/>
+          <p:nvPr/>
+        </p:nvGrpSpPr>
+        <p:grpSpPr>
+          <a:xfrm>
+            <a:off x="980646" y="330602"/>
+            <a:ext cx="650347" cy="832444"/>
+            <a:chOff x="949852" y="243681"/>
+            <a:chExt cx="650347" cy="832444"/>
+          </a:xfrm>
+        </p:grpSpPr>
+        <p:sp>
+          <p:nvSpPr>
+            <p:cNvPr id="5" name="Freeform 7"/>
+            <p:cNvSpPr>
+              <a:spLocks noEditPoints="1"/>
+            </p:cNvSpPr>
+            <p:nvPr/>
+          </p:nvSpPr>
+          <p:spPr bwMode="auto">
+            <a:xfrm>
+              <a:off x="949852" y="243681"/>
+              <a:ext cx="650347" cy="832444"/>
+            </a:xfrm>
+            <a:custGeom>
+              <a:avLst/>
+              <a:gdLst>
+                <a:gd name="T0" fmla="*/ 264 w 311"/>
+                <a:gd name="T1" fmla="*/ 0 h 400"/>
+                <a:gd name="T2" fmla="*/ 264 w 311"/>
+                <a:gd name="T3" fmla="*/ 9 h 400"/>
+                <a:gd name="T4" fmla="*/ 260 w 311"/>
+                <a:gd name="T5" fmla="*/ 21 h 400"/>
+                <a:gd name="T6" fmla="*/ 244 w 311"/>
+                <a:gd name="T7" fmla="*/ 28 h 400"/>
+                <a:gd name="T8" fmla="*/ 245 w 311"/>
+                <a:gd name="T9" fmla="*/ 14 h 400"/>
+                <a:gd name="T10" fmla="*/ 156 w 311"/>
+                <a:gd name="T11" fmla="*/ 14 h 400"/>
+                <a:gd name="T12" fmla="*/ 155 w 311"/>
+                <a:gd name="T13" fmla="*/ 14 h 400"/>
+                <a:gd name="T14" fmla="*/ 66 w 311"/>
+                <a:gd name="T15" fmla="*/ 14 h 400"/>
+                <a:gd name="T16" fmla="*/ 67 w 311"/>
+                <a:gd name="T17" fmla="*/ 28 h 400"/>
+                <a:gd name="T18" fmla="*/ 51 w 311"/>
+                <a:gd name="T19" fmla="*/ 21 h 400"/>
+                <a:gd name="T20" fmla="*/ 47 w 311"/>
+                <a:gd name="T21" fmla="*/ 9 h 400"/>
+                <a:gd name="T22" fmla="*/ 47 w 311"/>
+                <a:gd name="T23" fmla="*/ 0 h 400"/>
+                <a:gd name="T24" fmla="*/ 0 w 311"/>
+                <a:gd name="T25" fmla="*/ 0 h 400"/>
+                <a:gd name="T26" fmla="*/ 0 w 311"/>
+                <a:gd name="T27" fmla="*/ 9 h 400"/>
+                <a:gd name="T28" fmla="*/ 96 w 311"/>
+                <a:gd name="T29" fmla="*/ 206 h 400"/>
+                <a:gd name="T30" fmla="*/ 91 w 311"/>
+                <a:gd name="T31" fmla="*/ 213 h 400"/>
+                <a:gd name="T32" fmla="*/ 106 w 311"/>
+                <a:gd name="T33" fmla="*/ 222 h 400"/>
+                <a:gd name="T34" fmla="*/ 110 w 311"/>
+                <a:gd name="T35" fmla="*/ 216 h 400"/>
+                <a:gd name="T36" fmla="*/ 132 w 311"/>
+                <a:gd name="T37" fmla="*/ 254 h 400"/>
+                <a:gd name="T38" fmla="*/ 125 w 311"/>
+                <a:gd name="T39" fmla="*/ 254 h 400"/>
+                <a:gd name="T40" fmla="*/ 125 w 311"/>
+                <a:gd name="T41" fmla="*/ 268 h 400"/>
+                <a:gd name="T42" fmla="*/ 133 w 311"/>
+                <a:gd name="T43" fmla="*/ 268 h 400"/>
+                <a:gd name="T44" fmla="*/ 87 w 311"/>
+                <a:gd name="T45" fmla="*/ 314 h 400"/>
+                <a:gd name="T46" fmla="*/ 87 w 311"/>
+                <a:gd name="T47" fmla="*/ 327 h 400"/>
+                <a:gd name="T48" fmla="*/ 77 w 311"/>
+                <a:gd name="T49" fmla="*/ 327 h 400"/>
+                <a:gd name="T50" fmla="*/ 77 w 311"/>
+                <a:gd name="T51" fmla="*/ 400 h 400"/>
+                <a:gd name="T52" fmla="*/ 155 w 311"/>
+                <a:gd name="T53" fmla="*/ 400 h 400"/>
+                <a:gd name="T54" fmla="*/ 156 w 311"/>
+                <a:gd name="T55" fmla="*/ 400 h 400"/>
+                <a:gd name="T56" fmla="*/ 234 w 311"/>
+                <a:gd name="T57" fmla="*/ 400 h 400"/>
+                <a:gd name="T58" fmla="*/ 234 w 311"/>
+                <a:gd name="T59" fmla="*/ 327 h 400"/>
+                <a:gd name="T60" fmla="*/ 224 w 311"/>
+                <a:gd name="T61" fmla="*/ 327 h 400"/>
+                <a:gd name="T62" fmla="*/ 224 w 311"/>
+                <a:gd name="T63" fmla="*/ 314 h 400"/>
+                <a:gd name="T64" fmla="*/ 178 w 311"/>
+                <a:gd name="T65" fmla="*/ 268 h 400"/>
+                <a:gd name="T66" fmla="*/ 186 w 311"/>
+                <a:gd name="T67" fmla="*/ 268 h 400"/>
+                <a:gd name="T68" fmla="*/ 186 w 311"/>
+                <a:gd name="T69" fmla="*/ 254 h 400"/>
+                <a:gd name="T70" fmla="*/ 179 w 311"/>
+                <a:gd name="T71" fmla="*/ 254 h 400"/>
+                <a:gd name="T72" fmla="*/ 201 w 311"/>
+                <a:gd name="T73" fmla="*/ 216 h 400"/>
+                <a:gd name="T74" fmla="*/ 206 w 311"/>
+                <a:gd name="T75" fmla="*/ 222 h 400"/>
+                <a:gd name="T76" fmla="*/ 220 w 311"/>
+                <a:gd name="T77" fmla="*/ 213 h 400"/>
+                <a:gd name="T78" fmla="*/ 215 w 311"/>
+                <a:gd name="T79" fmla="*/ 206 h 400"/>
+                <a:gd name="T80" fmla="*/ 311 w 311"/>
+                <a:gd name="T81" fmla="*/ 9 h 400"/>
+                <a:gd name="T82" fmla="*/ 311 w 311"/>
+                <a:gd name="T83" fmla="*/ 0 h 400"/>
+                <a:gd name="T84" fmla="*/ 264 w 311"/>
+                <a:gd name="T85" fmla="*/ 0 h 400"/>
+                <a:gd name="T86" fmla="*/ 18 w 311"/>
+                <a:gd name="T87" fmla="*/ 17 h 400"/>
+                <a:gd name="T88" fmla="*/ 30 w 311"/>
+                <a:gd name="T89" fmla="*/ 17 h 400"/>
+                <a:gd name="T90" fmla="*/ 39 w 311"/>
+                <a:gd name="T91" fmla="*/ 33 h 400"/>
+                <a:gd name="T92" fmla="*/ 68 w 311"/>
+                <a:gd name="T93" fmla="*/ 46 h 400"/>
+                <a:gd name="T94" fmla="*/ 97 w 311"/>
+                <a:gd name="T95" fmla="*/ 188 h 400"/>
+                <a:gd name="T96" fmla="*/ 18 w 311"/>
+                <a:gd name="T97" fmla="*/ 17 h 400"/>
+                <a:gd name="T98" fmla="*/ 214 w 311"/>
+                <a:gd name="T99" fmla="*/ 188 h 400"/>
+                <a:gd name="T100" fmla="*/ 243 w 311"/>
+                <a:gd name="T101" fmla="*/ 46 h 400"/>
+                <a:gd name="T102" fmla="*/ 272 w 311"/>
+                <a:gd name="T103" fmla="*/ 33 h 400"/>
+                <a:gd name="T104" fmla="*/ 281 w 311"/>
+                <a:gd name="T105" fmla="*/ 17 h 400"/>
+                <a:gd name="T106" fmla="*/ 293 w 311"/>
+                <a:gd name="T107" fmla="*/ 17 h 400"/>
+                <a:gd name="T108" fmla="*/ 214 w 311"/>
+                <a:gd name="T109" fmla="*/ 188 h 400"/>
+              </a:gdLst>
+              <a:ahLst/>
+              <a:cxnLst>
+                <a:cxn ang="0">
+                  <a:pos x="T0" y="T1"/>
+                </a:cxn>
+                <a:cxn ang="0">
+                  <a:pos x="T2" y="T3"/>
+                </a:cxn>
+                <a:cxn ang="0">
+                  <a:pos x="T4" y="T5"/>
+                </a:cxn>
+                <a:cxn ang="0">
+                  <a:pos x="T6" y="T7"/>
+                </a:cxn>
+                <a:cxn ang="0">
+                  <a:pos x="T8" y="T9"/>
+                </a:cxn>
+                <a:cxn ang="0">
+                  <a:pos x="T10" y="T11"/>
+                </a:cxn>
+                <a:cxn ang="0">
+                  <a:pos x="T12" y="T13"/>
+                </a:cxn>
+                <a:cxn ang="0">
+                  <a:pos x="T14" y="T15"/>
+                </a:cxn>
+                <a:cxn ang="0">
+                  <a:pos x="T16" y="T17"/>
+                </a:cxn>
+                <a:cxn ang="0">
+                  <a:pos x="T18" y="T19"/>
+                </a:cxn>
+                <a:cxn ang="0">
+                  <a:pos x="T20" y="T21"/>
+                </a:cxn>
+                <a:cxn ang="0">
+                  <a:pos x="T22" y="T23"/>
+                </a:cxn>
+                <a:cxn ang="0">
+                  <a:pos x="T24" y="T25"/>
+                </a:cxn>
+                <a:cxn ang="0">
+                  <a:pos x="T26" y="T27"/>
+                </a:cxn>
+                <a:cxn ang="0">
+                  <a:pos x="T28" y="T29"/>
+                </a:cxn>
+                <a:cxn ang="0">
+                  <a:pos x="T30" y="T31"/>
+                </a:cxn>
+                <a:cxn ang="0">
+                  <a:pos x="T32" y="T33"/>
+                </a:cxn>
+                <a:cxn ang="0">
+                  <a:pos x="T34" y="T35"/>
+                </a:cxn>
+                <a:cxn ang="0">
+                  <a:pos x="T36" y="T37"/>
+                </a:cxn>
+                <a:cxn ang="0">
+                  <a:pos x="T38" y="T39"/>
+                </a:cxn>
+                <a:cxn ang="0">
+                  <a:pos x="T40" y="T41"/>
+                </a:cxn>
+                <a:cxn ang="0">
+                  <a:pos x="T42" y="T43"/>
+                </a:cxn>
+                <a:cxn ang="0">
+                  <a:pos x="T44" y="T45"/>
+                </a:cxn>
+                <a:cxn ang="0">
+                  <a:pos x="T46" y="T47"/>
+                </a:cxn>
+                <a:cxn ang="0">
+                  <a:pos x="T48" y="T49"/>
+                </a:cxn>
+                <a:cxn ang="0">
+                  <a:pos x="T50" y="T51"/>
+                </a:cxn>
+                <a:cxn ang="0">
+                  <a:pos x="T52" y="T53"/>
+                </a:cxn>
+                <a:cxn ang="0">
+                  <a:pos x="T54" y="T55"/>
+                </a:cxn>
+                <a:cxn ang="0">
+                  <a:pos x="T56" y="T57"/>
+                </a:cxn>
+                <a:cxn ang="0">
+                  <a:pos x="T58" y="T59"/>
+                </a:cxn>
+                <a:cxn ang="0">
+                  <a:pos x="T60" y="T61"/>
+                </a:cxn>
+                <a:cxn ang="0">
+                  <a:pos x="T62" y="T63"/>
+                </a:cxn>
+                <a:cxn ang="0">
+                  <a:pos x="T64" y="T65"/>
+                </a:cxn>
+                <a:cxn ang="0">
+                  <a:pos x="T66" y="T67"/>
+                </a:cxn>
+                <a:cxn ang="0">
+                  <a:pos x="T68" y="T69"/>
+                </a:cxn>
+                <a:cxn ang="0">
+                  <a:pos x="T70" y="T71"/>
+                </a:cxn>
+                <a:cxn ang="0">
+                  <a:pos x="T72" y="T73"/>
+                </a:cxn>
+                <a:cxn ang="0">
+                  <a:pos x="T74" y="T75"/>
+                </a:cxn>
+                <a:cxn ang="0">
+                  <a:pos x="T76" y="T77"/>
+                </a:cxn>
+                <a:cxn ang="0">
+                  <a:pos x="T78" y="T79"/>
+                </a:cxn>
+                <a:cxn ang="0">
+                  <a:pos x="T80" y="T81"/>
+                </a:cxn>
+                <a:cxn ang="0">
+                  <a:pos x="T82" y="T83"/>
+                </a:cxn>
+                <a:cxn ang="0">
+                  <a:pos x="T84" y="T85"/>
+                </a:cxn>
+                <a:cxn ang="0">
+                  <a:pos x="T86" y="T87"/>
+                </a:cxn>
+                <a:cxn ang="0">
+                  <a:pos x="T88" y="T89"/>
+                </a:cxn>
+                <a:cxn ang="0">
+                  <a:pos x="T90" y="T91"/>
+                </a:cxn>
+                <a:cxn ang="0">
+                  <a:pos x="T92" y="T93"/>
+                </a:cxn>
+                <a:cxn ang="0">
+                  <a:pos x="T94" y="T95"/>
+                </a:cxn>
+                <a:cxn ang="0">
+                  <a:pos x="T96" y="T97"/>
+                </a:cxn>
+                <a:cxn ang="0">
+                  <a:pos x="T98" y="T99"/>
+                </a:cxn>
+                <a:cxn ang="0">
+                  <a:pos x="T100" y="T101"/>
+                </a:cxn>
+                <a:cxn ang="0">
+                  <a:pos x="T102" y="T103"/>
+                </a:cxn>
+                <a:cxn ang="0">
+                  <a:pos x="T104" y="T105"/>
+                </a:cxn>
+                <a:cxn ang="0">
+                  <a:pos x="T106" y="T107"/>
+                </a:cxn>
+                <a:cxn ang="0">
+                  <a:pos x="T108" y="T109"/>
+                </a:cxn>
+              </a:cxnLst>
+              <a:rect l="0" t="0" r="r" b="b"/>
+              <a:pathLst>
+                <a:path w="311" h="400">
+                  <a:moveTo>
+                    <a:pt x="264" y="0"/>
+                  </a:moveTo>
+                  <a:lnTo>
+                    <a:pt x="264" y="9"/>
+                  </a:lnTo>
+                  <a:cubicBezTo>
+                    <a:pt x="264" y="14"/>
+                    <a:pt x="263" y="18"/>
+                    <a:pt x="260" y="21"/>
+                  </a:cubicBezTo>
+                  <a:cubicBezTo>
+                    <a:pt x="256" y="25"/>
+                    <a:pt x="250" y="27"/>
+                    <a:pt x="244" y="28"/>
+                  </a:cubicBezTo>
+                  <a:cubicBezTo>
+                    <a:pt x="245" y="24"/>
+                    <a:pt x="245" y="19"/>
+                    <a:pt x="245" y="14"/>
+                  </a:cubicBezTo>
+                  <a:lnTo>
+                    <a:pt x="156" y="14"/>
+                  </a:lnTo>
+                  <a:lnTo>
+                    <a:pt x="155" y="14"/>
+                  </a:lnTo>
+                  <a:lnTo>
+                    <a:pt x="66" y="14"/>
+                  </a:lnTo>
+                  <a:cubicBezTo>
+                    <a:pt x="66" y="19"/>
+                    <a:pt x="66" y="24"/>
+                    <a:pt x="67" y="28"/>
+                  </a:cubicBezTo>
+                  <a:cubicBezTo>
+                    <a:pt x="61" y="27"/>
+                    <a:pt x="55" y="25"/>
+                    <a:pt x="51" y="21"/>
+                  </a:cubicBezTo>
+                  <a:cubicBezTo>
+                    <a:pt x="48" y="18"/>
+                    <a:pt x="47" y="14"/>
+                    <a:pt x="47" y="9"/>
+                  </a:cubicBezTo>
+                  <a:lnTo>
+                    <a:pt x="47" y="0"/>
+                  </a:lnTo>
+                  <a:lnTo>
+                    <a:pt x="0" y="0"/>
+                  </a:lnTo>
+                  <a:lnTo>
+                    <a:pt x="0" y="9"/>
+                  </a:lnTo>
+                  <a:cubicBezTo>
+                    <a:pt x="3" y="160"/>
+                    <a:pt x="67" y="197"/>
+                    <a:pt x="96" y="206"/>
+                  </a:cubicBezTo>
+                  <a:lnTo>
+                    <a:pt x="91" y="213"/>
+                  </a:lnTo>
+                  <a:lnTo>
+                    <a:pt x="106" y="222"/>
+                  </a:lnTo>
+                  <a:lnTo>
+                    <a:pt x="110" y="216"/>
+                  </a:lnTo>
+                  <a:cubicBezTo>
+                    <a:pt x="120" y="234"/>
+                    <a:pt x="128" y="245"/>
+                    <a:pt x="132" y="254"/>
+                  </a:cubicBezTo>
+                  <a:lnTo>
+                    <a:pt x="125" y="254"/>
+                  </a:lnTo>
+                  <a:lnTo>
+                    <a:pt x="125" y="268"/>
+                  </a:lnTo>
+                  <a:lnTo>
+                    <a:pt x="133" y="268"/>
+                  </a:lnTo>
+                  <a:cubicBezTo>
+                    <a:pt x="130" y="289"/>
+                    <a:pt x="87" y="314"/>
+                    <a:pt x="87" y="314"/>
+                  </a:cubicBezTo>
+                  <a:lnTo>
+                    <a:pt x="87" y="327"/>
+                  </a:lnTo>
+                  <a:lnTo>
+                    <a:pt x="77" y="327"/>
+                  </a:lnTo>
+                  <a:lnTo>
+                    <a:pt x="77" y="400"/>
+                  </a:lnTo>
+                  <a:lnTo>
+                    <a:pt x="155" y="400"/>
+                  </a:lnTo>
+                  <a:lnTo>
+                    <a:pt x="156" y="400"/>
+                  </a:lnTo>
+                  <a:lnTo>
+                    <a:pt x="234" y="400"/>
+                  </a:lnTo>
+                  <a:lnTo>
+                    <a:pt x="234" y="327"/>
+                  </a:lnTo>
+                  <a:lnTo>
+                    <a:pt x="224" y="327"/>
+                  </a:lnTo>
+                  <a:lnTo>
+                    <a:pt x="224" y="314"/>
+                  </a:lnTo>
+                  <a:cubicBezTo>
+                    <a:pt x="224" y="314"/>
+                    <a:pt x="181" y="289"/>
+                    <a:pt x="178" y="268"/>
+                  </a:cubicBezTo>
+                  <a:lnTo>
+                    <a:pt x="186" y="268"/>
+                  </a:lnTo>
+                  <a:lnTo>
+                    <a:pt x="186" y="254"/>
+                  </a:lnTo>
+                  <a:lnTo>
+                    <a:pt x="179" y="254"/>
+                  </a:lnTo>
+                  <a:cubicBezTo>
+                    <a:pt x="183" y="245"/>
+                    <a:pt x="191" y="234"/>
+                    <a:pt x="201" y="216"/>
+                  </a:cubicBezTo>
+                  <a:lnTo>
+                    <a:pt x="206" y="222"/>
+                  </a:lnTo>
+                  <a:lnTo>
+                    <a:pt x="220" y="213"/>
+                  </a:lnTo>
+                  <a:lnTo>
+                    <a:pt x="215" y="206"/>
+                  </a:lnTo>
+                  <a:cubicBezTo>
+                    <a:pt x="244" y="197"/>
+                    <a:pt x="308" y="160"/>
+                    <a:pt x="311" y="9"/>
+                  </a:cubicBezTo>
+                  <a:lnTo>
+                    <a:pt x="311" y="0"/>
+                  </a:lnTo>
+                  <a:lnTo>
+                    <a:pt x="264" y="0"/>
+                  </a:lnTo>
+                  <a:close/>
+                  <a:moveTo>
+                    <a:pt x="18" y="17"/>
+                  </a:moveTo>
+                  <a:lnTo>
+                    <a:pt x="30" y="17"/>
+                  </a:lnTo>
+                  <a:cubicBezTo>
+                    <a:pt x="31" y="24"/>
+                    <a:pt x="34" y="29"/>
+                    <a:pt x="39" y="33"/>
+                  </a:cubicBezTo>
+                  <a:cubicBezTo>
+                    <a:pt x="47" y="42"/>
+                    <a:pt x="60" y="45"/>
+                    <a:pt x="68" y="46"/>
+                  </a:cubicBezTo>
+                  <a:cubicBezTo>
+                    <a:pt x="72" y="112"/>
+                    <a:pt x="84" y="157"/>
+                    <a:pt x="97" y="188"/>
+                  </a:cubicBezTo>
+                  <a:cubicBezTo>
+                    <a:pt x="72" y="179"/>
+                    <a:pt x="22" y="144"/>
+                    <a:pt x="18" y="17"/>
+                  </a:cubicBezTo>
+                  <a:close/>
+                  <a:moveTo>
+                    <a:pt x="214" y="188"/>
+                  </a:moveTo>
+                  <a:cubicBezTo>
+                    <a:pt x="227" y="157"/>
+                    <a:pt x="239" y="112"/>
+                    <a:pt x="243" y="46"/>
+                  </a:cubicBezTo>
+                  <a:cubicBezTo>
+                    <a:pt x="251" y="45"/>
+                    <a:pt x="264" y="42"/>
+                    <a:pt x="272" y="33"/>
+                  </a:cubicBezTo>
+                  <a:cubicBezTo>
+                    <a:pt x="277" y="29"/>
+                    <a:pt x="280" y="24"/>
+                    <a:pt x="281" y="17"/>
+                  </a:cubicBezTo>
+                  <a:lnTo>
+                    <a:pt x="293" y="17"/>
+                  </a:lnTo>
+                  <a:cubicBezTo>
+                    <a:pt x="289" y="144"/>
+                    <a:pt x="239" y="179"/>
+                    <a:pt x="214" y="188"/>
+                  </a:cubicBezTo>
+                  <a:close/>
+                </a:path>
+              </a:pathLst>
+            </a:custGeom>
+            <a:solidFill>
+              <a:schemeClr val="accent6">
+                <a:lumMod val="75000"/>
+              </a:schemeClr>
+            </a:solidFill>
+            <a:ln w="0">
+              <a:solidFill>
+                <a:schemeClr val="accent6">
+                  <a:lumMod val="75000"/>
+                </a:schemeClr>
+              </a:solidFill>
+              <a:prstDash val="solid"/>
+              <a:round/>
+              <a:headEnd/>
+              <a:tailEnd/>
+            </a:ln>
+          </p:spPr>
+          <p:txBody>
+            <a:bodyPr vert="horz" wrap="square" lIns="91440" tIns="45720" rIns="91440" bIns="45720" numCol="1" anchor="t" anchorCtr="0" compatLnSpc="1">
+              <a:prstTxWarp prst="textNoShape">
+                <a:avLst/>
+              </a:prstTxWarp>
+            </a:bodyPr>
+            <a:lstStyle/>
+            <a:p>
+              <a:endParaRPr lang="en-US"/>
+            </a:p>
+          </p:txBody>
+        </p:sp>
+        <p:sp>
+          <p:nvSpPr>
+            <p:cNvPr id="28" name="Flowchart: Connector 27"/>
+            <p:cNvSpPr/>
+            <p:nvPr/>
+          </p:nvSpPr>
+          <p:spPr>
+            <a:xfrm>
+              <a:off x="1160725" y="319881"/>
+              <a:ext cx="228600" cy="228600"/>
+            </a:xfrm>
+            <a:prstGeom prst="flowChartConnector">
+              <a:avLst/>
+            </a:prstGeom>
+            <a:solidFill>
+              <a:schemeClr val="bg1">
+                <a:lumMod val="95000"/>
+              </a:schemeClr>
+            </a:solidFill>
+            <a:ln>
+              <a:noFill/>
+            </a:ln>
+          </p:spPr>
+          <p:style>
+            <a:lnRef idx="2">
+              <a:schemeClr val="accent1">
+                <a:shade val="50000"/>
+              </a:schemeClr>
+            </a:lnRef>
+            <a:fillRef idx="1">
+              <a:schemeClr val="accent1"/>
+            </a:fillRef>
+            <a:effectRef idx="0">
+              <a:schemeClr val="accent1"/>
+            </a:effectRef>
+            <a:fontRef idx="minor">
+              <a:schemeClr val="lt1"/>
+            </a:fontRef>
+          </p:style>
+          <p:txBody>
+            <a:bodyPr rtlCol="0" anchor="ctr"/>
+            <a:lstStyle/>
+            <a:p>
+              <a:pPr algn="ctr"/>
+              <a:r>
+                <a:rPr lang="en-US" sz="1600" b="1" dirty="0" smtClean="0">
+                  <a:solidFill>
+                    <a:srgbClr val="0070C0"/>
+                  </a:solidFill>
+                </a:rPr>
+                <a:t>1</a:t>
+              </a:r>
+              <a:endParaRPr lang="en-US" sz="1600" b="1" dirty="0">
+                <a:solidFill>
+                  <a:srgbClr val="0070C0"/>
+                </a:solidFill>
+              </a:endParaRPr>
+            </a:p>
+          </p:txBody>
+        </p:sp>
+      </p:grpSp>
+      <p:grpSp>
+        <p:nvGrpSpPr>
+          <p:cNvPr id="32" name="Group 31"/>
+          <p:cNvGrpSpPr/>
+          <p:nvPr/>
+        </p:nvGrpSpPr>
+        <p:grpSpPr>
+          <a:xfrm>
+            <a:off x="533400" y="926506"/>
+            <a:ext cx="677495" cy="793282"/>
+            <a:chOff x="533400" y="926506"/>
+            <a:chExt cx="677495" cy="793282"/>
+          </a:xfrm>
+        </p:grpSpPr>
+        <p:sp>
+          <p:nvSpPr>
+            <p:cNvPr id="19" name="Flowchart: Delay 18"/>
+            <p:cNvSpPr/>
+            <p:nvPr/>
+          </p:nvSpPr>
+          <p:spPr>
+            <a:xfrm rot="16200000">
+              <a:off x="551541" y="1274393"/>
+              <a:ext cx="427254" cy="463536"/>
+            </a:xfrm>
+            <a:prstGeom prst="flowChartDelay">
+              <a:avLst/>
+            </a:prstGeom>
+            <a:solidFill>
+              <a:schemeClr val="bg1"/>
+            </a:solidFill>
+            <a:ln w="38100">
+              <a:solidFill>
+                <a:schemeClr val="bg1">
+                  <a:lumMod val="75000"/>
+                </a:schemeClr>
+              </a:solidFill>
+            </a:ln>
+          </p:spPr>
+          <p:style>
+            <a:lnRef idx="2">
+              <a:schemeClr val="accent1">
+                <a:shade val="50000"/>
+              </a:schemeClr>
+            </a:lnRef>
+            <a:fillRef idx="1">
+              <a:schemeClr val="accent1"/>
+            </a:fillRef>
+            <a:effectRef idx="0">
+              <a:schemeClr val="accent1"/>
+            </a:effectRef>
+            <a:fontRef idx="minor">
+              <a:schemeClr val="lt1"/>
+            </a:fontRef>
+          </p:style>
+          <p:txBody>
+            <a:bodyPr rtlCol="0" anchor="ctr"/>
+            <a:lstStyle/>
+            <a:p>
+              <a:pPr algn="ctr"/>
+              <a:endParaRPr lang="en-SG"/>
+            </a:p>
+          </p:txBody>
+        </p:sp>
+        <p:grpSp>
+          <p:nvGrpSpPr>
+            <p:cNvPr id="31" name="Group 30"/>
+            <p:cNvGrpSpPr/>
+            <p:nvPr/>
+          </p:nvGrpSpPr>
+          <p:grpSpPr>
+            <a:xfrm rot="19339417">
+              <a:off x="594113" y="926506"/>
+              <a:ext cx="394504" cy="336286"/>
+              <a:chOff x="594113" y="926506"/>
+              <a:chExt cx="394504" cy="336286"/>
+            </a:xfrm>
+          </p:grpSpPr>
+          <p:sp>
+            <p:nvSpPr>
+              <p:cNvPr id="15" name="Flowchart: Connector 14"/>
+              <p:cNvSpPr/>
+              <p:nvPr/>
+            </p:nvSpPr>
+            <p:spPr>
+              <a:xfrm>
+                <a:off x="594113" y="926506"/>
+                <a:ext cx="342109" cy="336286"/>
+              </a:xfrm>
+              <a:prstGeom prst="flowChartConnector">
+                <a:avLst/>
+              </a:prstGeom>
+              <a:solidFill>
+                <a:schemeClr val="bg1"/>
+              </a:solidFill>
+              <a:ln w="38100">
+                <a:solidFill>
+                  <a:schemeClr val="bg1">
+                    <a:lumMod val="75000"/>
+                  </a:schemeClr>
+                </a:solidFill>
+              </a:ln>
+            </p:spPr>
+            <p:style>
+              <a:lnRef idx="2">
+                <a:schemeClr val="accent1">
+                  <a:shade val="50000"/>
+                </a:schemeClr>
+              </a:lnRef>
+              <a:fillRef idx="1">
+                <a:schemeClr val="accent1"/>
+              </a:fillRef>
+              <a:effectRef idx="0">
+                <a:schemeClr val="accent1"/>
+              </a:effectRef>
+              <a:fontRef idx="minor">
+                <a:schemeClr val="lt1"/>
+              </a:fontRef>
+            </p:style>
+            <p:txBody>
+              <a:bodyPr rtlCol="0" anchor="ctr"/>
+              <a:lstStyle/>
+              <a:p>
+                <a:pPr algn="ctr"/>
+                <a:endParaRPr lang="en-SG"/>
+              </a:p>
+            </p:txBody>
+          </p:sp>
+          <p:sp>
+            <p:nvSpPr>
+              <p:cNvPr id="17" name="Freeform 16"/>
+              <p:cNvSpPr/>
+              <p:nvPr/>
+            </p:nvSpPr>
+            <p:spPr>
+              <a:xfrm>
+                <a:off x="911089" y="1170632"/>
+                <a:ext cx="77528" cy="29032"/>
+              </a:xfrm>
+              <a:custGeom>
+                <a:avLst/>
+                <a:gdLst>
+                  <a:gd name="connsiteX0" fmla="*/ 0 w 50006"/>
+                  <a:gd name="connsiteY0" fmla="*/ 0 h 19050"/>
+                  <a:gd name="connsiteX1" fmla="*/ 0 w 50006"/>
+                  <a:gd name="connsiteY1" fmla="*/ 0 h 19050"/>
+                  <a:gd name="connsiteX2" fmla="*/ 21431 w 50006"/>
+                  <a:gd name="connsiteY2" fmla="*/ 4762 h 19050"/>
+                  <a:gd name="connsiteX3" fmla="*/ 28575 w 50006"/>
+                  <a:gd name="connsiteY3" fmla="*/ 9525 h 19050"/>
+                  <a:gd name="connsiteX4" fmla="*/ 38100 w 50006"/>
+                  <a:gd name="connsiteY4" fmla="*/ 14287 h 19050"/>
+                  <a:gd name="connsiteX5" fmla="*/ 50006 w 50006"/>
+                  <a:gd name="connsiteY5" fmla="*/ 19050 h 19050"/>
+                </a:gdLst>
+                <a:ahLst/>
+                <a:cxnLst>
+                  <a:cxn ang="0">
+                    <a:pos x="connsiteX0" y="connsiteY0"/>
+                  </a:cxn>
+                  <a:cxn ang="0">
+                    <a:pos x="connsiteX1" y="connsiteY1"/>
+                  </a:cxn>
+                  <a:cxn ang="0">
+                    <a:pos x="connsiteX2" y="connsiteY2"/>
+                  </a:cxn>
+                  <a:cxn ang="0">
+                    <a:pos x="connsiteX3" y="connsiteY3"/>
+                  </a:cxn>
+                  <a:cxn ang="0">
+                    <a:pos x="connsiteX4" y="connsiteY4"/>
+                  </a:cxn>
+                  <a:cxn ang="0">
+                    <a:pos x="connsiteX5" y="connsiteY5"/>
+                  </a:cxn>
+                </a:cxnLst>
+                <a:rect l="l" t="t" r="r" b="b"/>
+                <a:pathLst>
+                  <a:path w="50006" h="19050">
+                    <a:moveTo>
+                      <a:pt x="0" y="0"/>
+                    </a:moveTo>
+                    <a:lnTo>
+                      <a:pt x="0" y="0"/>
+                    </a:lnTo>
+                    <a:cubicBezTo>
+                      <a:pt x="7144" y="1587"/>
+                      <a:pt x="14489" y="2448"/>
+                      <a:pt x="21431" y="4762"/>
+                    </a:cubicBezTo>
+                    <a:cubicBezTo>
+                      <a:pt x="24146" y="5667"/>
+                      <a:pt x="26090" y="8105"/>
+                      <a:pt x="28575" y="9525"/>
+                    </a:cubicBezTo>
+                    <a:cubicBezTo>
+                      <a:pt x="31657" y="11286"/>
+                      <a:pt x="34837" y="12889"/>
+                      <a:pt x="38100" y="14287"/>
+                    </a:cubicBezTo>
+                    <a:cubicBezTo>
+                      <a:pt x="58672" y="23103"/>
+                      <a:pt x="34691" y="11391"/>
+                      <a:pt x="50006" y="19050"/>
+                    </a:cubicBezTo>
+                  </a:path>
+                </a:pathLst>
+              </a:custGeom>
+              <a:solidFill>
+                <a:schemeClr val="bg1"/>
+              </a:solidFill>
+              <a:ln w="38100">
+                <a:solidFill>
+                  <a:schemeClr val="bg1">
+                    <a:lumMod val="75000"/>
+                  </a:schemeClr>
+                </a:solidFill>
+              </a:ln>
+            </p:spPr>
+            <p:style>
+              <a:lnRef idx="2">
+                <a:schemeClr val="accent1">
+                  <a:shade val="50000"/>
+                </a:schemeClr>
+              </a:lnRef>
+              <a:fillRef idx="1">
+                <a:schemeClr val="accent1"/>
+              </a:fillRef>
+              <a:effectRef idx="0">
+                <a:schemeClr val="accent1"/>
+              </a:effectRef>
+              <a:fontRef idx="minor">
+                <a:schemeClr val="lt1"/>
+              </a:fontRef>
+            </p:style>
+            <p:txBody>
+              <a:bodyPr rtlCol="0" anchor="ctr"/>
+              <a:lstStyle/>
+              <a:p>
+                <a:pPr algn="ctr"/>
+                <a:endParaRPr lang="en-SG"/>
+              </a:p>
+            </p:txBody>
+          </p:sp>
+          <p:sp>
+            <p:nvSpPr>
+              <p:cNvPr id="18" name="Flowchart: Connector 17"/>
+              <p:cNvSpPr/>
+              <p:nvPr/>
+            </p:nvSpPr>
+            <p:spPr>
+              <a:xfrm>
+                <a:off x="783624" y="995229"/>
+                <a:ext cx="70882" cy="69675"/>
+              </a:xfrm>
+              <a:prstGeom prst="flowChartConnector">
+                <a:avLst/>
+              </a:prstGeom>
+              <a:solidFill>
+                <a:schemeClr val="bg1"/>
+              </a:solidFill>
+              <a:ln w="38100">
+                <a:solidFill>
+                  <a:schemeClr val="bg1">
+                    <a:lumMod val="75000"/>
+                  </a:schemeClr>
+                </a:solidFill>
+              </a:ln>
+            </p:spPr>
+            <p:style>
+              <a:lnRef idx="2">
+                <a:schemeClr val="accent1">
+                  <a:shade val="50000"/>
+                </a:schemeClr>
+              </a:lnRef>
+              <a:fillRef idx="1">
+                <a:schemeClr val="accent1"/>
+              </a:fillRef>
+              <a:effectRef idx="0">
+                <a:schemeClr val="accent1"/>
+              </a:effectRef>
+              <a:fontRef idx="minor">
+                <a:schemeClr val="lt1"/>
+              </a:fontRef>
+            </p:style>
+            <p:txBody>
+              <a:bodyPr rtlCol="0" anchor="ctr"/>
+              <a:lstStyle/>
+              <a:p>
+                <a:pPr algn="ctr"/>
+                <a:endParaRPr lang="en-SG"/>
+              </a:p>
+            </p:txBody>
+          </p:sp>
+        </p:grpSp>
+        <p:sp>
+          <p:nvSpPr>
+            <p:cNvPr id="30" name="Freeform 29"/>
+            <p:cNvSpPr/>
+            <p:nvPr/>
+          </p:nvSpPr>
+          <p:spPr>
+            <a:xfrm>
+              <a:off x="742483" y="1161064"/>
+              <a:ext cx="468412" cy="286528"/>
+            </a:xfrm>
+            <a:custGeom>
+              <a:avLst/>
+              <a:gdLst>
+                <a:gd name="connsiteX0" fmla="*/ 0 w 468412"/>
+                <a:gd name="connsiteY0" fmla="*/ 261613 h 286528"/>
+                <a:gd name="connsiteX1" fmla="*/ 348817 w 468412"/>
+                <a:gd name="connsiteY1" fmla="*/ 286528 h 286528"/>
+                <a:gd name="connsiteX2" fmla="*/ 468412 w 468412"/>
+                <a:gd name="connsiteY2" fmla="*/ 0 h 286528"/>
+              </a:gdLst>
+              <a:ahLst/>
+              <a:cxnLst>
+                <a:cxn ang="0">
+                  <a:pos x="connsiteX0" y="connsiteY0"/>
+                </a:cxn>
+                <a:cxn ang="0">
+                  <a:pos x="connsiteX1" y="connsiteY1"/>
+                </a:cxn>
+                <a:cxn ang="0">
+                  <a:pos x="connsiteX2" y="connsiteY2"/>
+                </a:cxn>
+              </a:cxnLst>
+              <a:rect l="l" t="t" r="r" b="b"/>
+              <a:pathLst>
+                <a:path w="468412" h="286528">
+                  <a:moveTo>
+                    <a:pt x="0" y="261613"/>
+                  </a:moveTo>
+                  <a:lnTo>
+                    <a:pt x="348817" y="286528"/>
+                  </a:lnTo>
+                  <a:lnTo>
+                    <a:pt x="468412" y="0"/>
+                  </a:lnTo>
+                </a:path>
+              </a:pathLst>
+            </a:custGeom>
+            <a:noFill/>
+            <a:ln w="38100">
+              <a:solidFill>
+                <a:schemeClr val="bg1">
+                  <a:lumMod val="75000"/>
+                </a:schemeClr>
+              </a:solidFill>
+              <a:tailEnd type="oval"/>
+            </a:ln>
+          </p:spPr>
+          <p:style>
+            <a:lnRef idx="2">
+              <a:schemeClr val="accent1">
+                <a:shade val="50000"/>
+              </a:schemeClr>
+            </a:lnRef>
+            <a:fillRef idx="1">
+              <a:schemeClr val="accent1"/>
+            </a:fillRef>
+            <a:effectRef idx="0">
+              <a:schemeClr val="accent1"/>
+            </a:effectRef>
+            <a:fontRef idx="minor">
+              <a:schemeClr val="lt1"/>
+            </a:fontRef>
+          </p:style>
+          <p:txBody>
+            <a:bodyPr rtlCol="0" anchor="ctr"/>
+            <a:lstStyle/>
+            <a:p>
+              <a:pPr algn="ctr"/>
+              <a:endParaRPr lang="en-US"/>
+            </a:p>
+          </p:txBody>
+        </p:sp>
+      </p:grpSp>
+      <p:grpSp>
+        <p:nvGrpSpPr>
+          <p:cNvPr id="36" name="Group 35"/>
+          <p:cNvGrpSpPr/>
+          <p:nvPr/>
+        </p:nvGrpSpPr>
+        <p:grpSpPr>
+          <a:xfrm flipH="1">
+            <a:off x="1399012" y="926506"/>
+            <a:ext cx="677495" cy="793282"/>
+            <a:chOff x="533400" y="926506"/>
+            <a:chExt cx="677495" cy="793282"/>
+          </a:xfrm>
+        </p:grpSpPr>
+        <p:sp>
+          <p:nvSpPr>
+            <p:cNvPr id="37" name="Flowchart: Delay 36"/>
+            <p:cNvSpPr/>
+            <p:nvPr/>
+          </p:nvSpPr>
+          <p:spPr>
+            <a:xfrm rot="16200000">
+              <a:off x="551541" y="1274393"/>
+              <a:ext cx="427254" cy="463536"/>
+            </a:xfrm>
+            <a:prstGeom prst="flowChartDelay">
+              <a:avLst/>
+            </a:prstGeom>
+            <a:solidFill>
+              <a:schemeClr val="bg1"/>
+            </a:solidFill>
+            <a:ln w="38100">
+              <a:solidFill>
+                <a:schemeClr val="bg1">
+                  <a:lumMod val="75000"/>
+                </a:schemeClr>
+              </a:solidFill>
+            </a:ln>
+          </p:spPr>
+          <p:style>
+            <a:lnRef idx="2">
+              <a:schemeClr val="accent1">
+                <a:shade val="50000"/>
+              </a:schemeClr>
+            </a:lnRef>
+            <a:fillRef idx="1">
+              <a:schemeClr val="accent1"/>
+            </a:fillRef>
+            <a:effectRef idx="0">
+              <a:schemeClr val="accent1"/>
+            </a:effectRef>
+            <a:fontRef idx="minor">
+              <a:schemeClr val="lt1"/>
+            </a:fontRef>
+          </p:style>
+          <p:txBody>
+            <a:bodyPr rtlCol="0" anchor="ctr"/>
+            <a:lstStyle/>
+            <a:p>
+              <a:pPr algn="ctr"/>
+              <a:endParaRPr lang="en-SG"/>
+            </a:p>
+          </p:txBody>
+        </p:sp>
+        <p:grpSp>
+          <p:nvGrpSpPr>
+            <p:cNvPr id="38" name="Group 37"/>
+            <p:cNvGrpSpPr/>
+            <p:nvPr/>
+          </p:nvGrpSpPr>
+          <p:grpSpPr>
+            <a:xfrm rot="19339417">
+              <a:off x="594113" y="926506"/>
+              <a:ext cx="394504" cy="336286"/>
+              <a:chOff x="594113" y="926506"/>
+              <a:chExt cx="394504" cy="336286"/>
+            </a:xfrm>
+          </p:grpSpPr>
+          <p:sp>
+            <p:nvSpPr>
+              <p:cNvPr id="40" name="Flowchart: Connector 39"/>
+              <p:cNvSpPr/>
+              <p:nvPr/>
+            </p:nvSpPr>
+            <p:spPr>
+              <a:xfrm>
+                <a:off x="594113" y="926506"/>
+                <a:ext cx="342109" cy="336286"/>
+              </a:xfrm>
+              <a:prstGeom prst="flowChartConnector">
+                <a:avLst/>
+              </a:prstGeom>
+              <a:solidFill>
+                <a:schemeClr val="bg1"/>
+              </a:solidFill>
+              <a:ln w="38100">
+                <a:solidFill>
+                  <a:schemeClr val="bg1">
+                    <a:lumMod val="75000"/>
+                  </a:schemeClr>
+                </a:solidFill>
+              </a:ln>
+            </p:spPr>
+            <p:style>
+              <a:lnRef idx="2">
+                <a:schemeClr val="accent1">
+                  <a:shade val="50000"/>
+                </a:schemeClr>
+              </a:lnRef>
+              <a:fillRef idx="1">
+                <a:schemeClr val="accent1"/>
+              </a:fillRef>
+              <a:effectRef idx="0">
+                <a:schemeClr val="accent1"/>
+              </a:effectRef>
+              <a:fontRef idx="minor">
+                <a:schemeClr val="lt1"/>
+              </a:fontRef>
+            </p:style>
+            <p:txBody>
+              <a:bodyPr rtlCol="0" anchor="ctr"/>
+              <a:lstStyle/>
+              <a:p>
+                <a:pPr algn="ctr"/>
+                <a:endParaRPr lang="en-SG"/>
+              </a:p>
+            </p:txBody>
+          </p:sp>
+          <p:sp>
+            <p:nvSpPr>
+              <p:cNvPr id="41" name="Freeform 40"/>
+              <p:cNvSpPr/>
+              <p:nvPr/>
+            </p:nvSpPr>
+            <p:spPr>
+              <a:xfrm>
+                <a:off x="911089" y="1170632"/>
+                <a:ext cx="77528" cy="29032"/>
+              </a:xfrm>
+              <a:custGeom>
+                <a:avLst/>
+                <a:gdLst>
+                  <a:gd name="connsiteX0" fmla="*/ 0 w 50006"/>
+                  <a:gd name="connsiteY0" fmla="*/ 0 h 19050"/>
+                  <a:gd name="connsiteX1" fmla="*/ 0 w 50006"/>
+                  <a:gd name="connsiteY1" fmla="*/ 0 h 19050"/>
+                  <a:gd name="connsiteX2" fmla="*/ 21431 w 50006"/>
+                  <a:gd name="connsiteY2" fmla="*/ 4762 h 19050"/>
+                  <a:gd name="connsiteX3" fmla="*/ 28575 w 50006"/>
+                  <a:gd name="connsiteY3" fmla="*/ 9525 h 19050"/>
+                  <a:gd name="connsiteX4" fmla="*/ 38100 w 50006"/>
+                  <a:gd name="connsiteY4" fmla="*/ 14287 h 19050"/>
+                  <a:gd name="connsiteX5" fmla="*/ 50006 w 50006"/>
+                  <a:gd name="connsiteY5" fmla="*/ 19050 h 19050"/>
+                </a:gdLst>
+                <a:ahLst/>
+                <a:cxnLst>
+                  <a:cxn ang="0">
+                    <a:pos x="connsiteX0" y="connsiteY0"/>
+                  </a:cxn>
+                  <a:cxn ang="0">
+                    <a:pos x="connsiteX1" y="connsiteY1"/>
+                  </a:cxn>
+                  <a:cxn ang="0">
+                    <a:pos x="connsiteX2" y="connsiteY2"/>
+                  </a:cxn>
+                  <a:cxn ang="0">
+                    <a:pos x="connsiteX3" y="connsiteY3"/>
+                  </a:cxn>
+                  <a:cxn ang="0">
+                    <a:pos x="connsiteX4" y="connsiteY4"/>
+                  </a:cxn>
+                  <a:cxn ang="0">
+                    <a:pos x="connsiteX5" y="connsiteY5"/>
+                  </a:cxn>
+                </a:cxnLst>
+                <a:rect l="l" t="t" r="r" b="b"/>
+                <a:pathLst>
+                  <a:path w="50006" h="19050">
+                    <a:moveTo>
+                      <a:pt x="0" y="0"/>
+                    </a:moveTo>
+                    <a:lnTo>
+                      <a:pt x="0" y="0"/>
+                    </a:lnTo>
+                    <a:cubicBezTo>
+                      <a:pt x="7144" y="1587"/>
+                      <a:pt x="14489" y="2448"/>
+                      <a:pt x="21431" y="4762"/>
+                    </a:cubicBezTo>
+                    <a:cubicBezTo>
+                      <a:pt x="24146" y="5667"/>
+                      <a:pt x="26090" y="8105"/>
+                      <a:pt x="28575" y="9525"/>
+                    </a:cubicBezTo>
+                    <a:cubicBezTo>
+                      <a:pt x="31657" y="11286"/>
+                      <a:pt x="34837" y="12889"/>
+                      <a:pt x="38100" y="14287"/>
+                    </a:cubicBezTo>
+                    <a:cubicBezTo>
+                      <a:pt x="58672" y="23103"/>
+                      <a:pt x="34691" y="11391"/>
+                      <a:pt x="50006" y="19050"/>
+                    </a:cubicBezTo>
+                  </a:path>
+                </a:pathLst>
+              </a:custGeom>
+              <a:solidFill>
+                <a:schemeClr val="bg1"/>
+              </a:solidFill>
+              <a:ln w="38100">
+                <a:solidFill>
+                  <a:schemeClr val="bg1">
+                    <a:lumMod val="75000"/>
+                  </a:schemeClr>
+                </a:solidFill>
+              </a:ln>
+            </p:spPr>
+            <p:style>
+              <a:lnRef idx="2">
+                <a:schemeClr val="accent1">
+                  <a:shade val="50000"/>
+                </a:schemeClr>
+              </a:lnRef>
+              <a:fillRef idx="1">
+                <a:schemeClr val="accent1"/>
+              </a:fillRef>
+              <a:effectRef idx="0">
+                <a:schemeClr val="accent1"/>
+              </a:effectRef>
+              <a:fontRef idx="minor">
+                <a:schemeClr val="lt1"/>
+              </a:fontRef>
+            </p:style>
+            <p:txBody>
+              <a:bodyPr rtlCol="0" anchor="ctr"/>
+              <a:lstStyle/>
+              <a:p>
+                <a:pPr algn="ctr"/>
+                <a:endParaRPr lang="en-SG"/>
+              </a:p>
+            </p:txBody>
+          </p:sp>
+          <p:sp>
+            <p:nvSpPr>
+              <p:cNvPr id="42" name="Flowchart: Connector 41"/>
+              <p:cNvSpPr/>
+              <p:nvPr/>
+            </p:nvSpPr>
+            <p:spPr>
+              <a:xfrm>
+                <a:off x="783624" y="995229"/>
+                <a:ext cx="70882" cy="69675"/>
+              </a:xfrm>
+              <a:prstGeom prst="flowChartConnector">
+                <a:avLst/>
+              </a:prstGeom>
+              <a:solidFill>
+                <a:schemeClr val="bg1"/>
+              </a:solidFill>
+              <a:ln w="38100">
+                <a:solidFill>
+                  <a:schemeClr val="bg1">
+                    <a:lumMod val="75000"/>
+                  </a:schemeClr>
+                </a:solidFill>
+              </a:ln>
+            </p:spPr>
+            <p:style>
+              <a:lnRef idx="2">
+                <a:schemeClr val="accent1">
+                  <a:shade val="50000"/>
+                </a:schemeClr>
+              </a:lnRef>
+              <a:fillRef idx="1">
+                <a:schemeClr val="accent1"/>
+              </a:fillRef>
+              <a:effectRef idx="0">
+                <a:schemeClr val="accent1"/>
+              </a:effectRef>
+              <a:fontRef idx="minor">
+                <a:schemeClr val="lt1"/>
+              </a:fontRef>
+            </p:style>
+            <p:txBody>
+              <a:bodyPr rtlCol="0" anchor="ctr"/>
+              <a:lstStyle/>
+              <a:p>
+                <a:pPr algn="ctr"/>
+                <a:endParaRPr lang="en-SG"/>
+              </a:p>
+            </p:txBody>
+          </p:sp>
+        </p:grpSp>
+        <p:sp>
+          <p:nvSpPr>
+            <p:cNvPr id="39" name="Freeform 38"/>
+            <p:cNvSpPr/>
+            <p:nvPr/>
+          </p:nvSpPr>
+          <p:spPr>
+            <a:xfrm>
+              <a:off x="742483" y="1161064"/>
+              <a:ext cx="468412" cy="286528"/>
+            </a:xfrm>
+            <a:custGeom>
+              <a:avLst/>
+              <a:gdLst>
+                <a:gd name="connsiteX0" fmla="*/ 0 w 468412"/>
+                <a:gd name="connsiteY0" fmla="*/ 261613 h 286528"/>
+                <a:gd name="connsiteX1" fmla="*/ 348817 w 468412"/>
+                <a:gd name="connsiteY1" fmla="*/ 286528 h 286528"/>
+                <a:gd name="connsiteX2" fmla="*/ 468412 w 468412"/>
+                <a:gd name="connsiteY2" fmla="*/ 0 h 286528"/>
+              </a:gdLst>
+              <a:ahLst/>
+              <a:cxnLst>
+                <a:cxn ang="0">
+                  <a:pos x="connsiteX0" y="connsiteY0"/>
+                </a:cxn>
+                <a:cxn ang="0">
+                  <a:pos x="connsiteX1" y="connsiteY1"/>
+                </a:cxn>
+                <a:cxn ang="0">
+                  <a:pos x="connsiteX2" y="connsiteY2"/>
+                </a:cxn>
+              </a:cxnLst>
+              <a:rect l="l" t="t" r="r" b="b"/>
+              <a:pathLst>
+                <a:path w="468412" h="286528">
+                  <a:moveTo>
+                    <a:pt x="0" y="261613"/>
+                  </a:moveTo>
+                  <a:lnTo>
+                    <a:pt x="348817" y="286528"/>
+                  </a:lnTo>
+                  <a:lnTo>
+                    <a:pt x="468412" y="0"/>
+                  </a:lnTo>
+                </a:path>
+              </a:pathLst>
+            </a:custGeom>
+            <a:noFill/>
+            <a:ln w="38100">
+              <a:solidFill>
+                <a:schemeClr val="bg1">
+                  <a:lumMod val="75000"/>
+                </a:schemeClr>
+              </a:solidFill>
+              <a:tailEnd type="oval"/>
+            </a:ln>
+          </p:spPr>
+          <p:style>
+            <a:lnRef idx="2">
+              <a:schemeClr val="accent1">
+                <a:shade val="50000"/>
+              </a:schemeClr>
+            </a:lnRef>
+            <a:fillRef idx="1">
+              <a:schemeClr val="accent1"/>
+            </a:fillRef>
+            <a:effectRef idx="0">
+              <a:schemeClr val="accent1"/>
+            </a:effectRef>
+            <a:fontRef idx="minor">
+              <a:schemeClr val="lt1"/>
+            </a:fontRef>
+          </p:style>
+          <p:txBody>
+            <a:bodyPr rtlCol="0" anchor="ctr"/>
+            <a:lstStyle/>
+            <a:p>
+              <a:pPr algn="ctr"/>
+              <a:endParaRPr lang="en-US"/>
+            </a:p>
+          </p:txBody>
+        </p:sp>
+      </p:grpSp>
+      <p:pic>
+        <p:nvPicPr>
+          <p:cNvPr id="1035" name="Picture 11" descr="http://dev.cashinonacorndog.com/images/confetti_falling.png"/>
+          <p:cNvPicPr>
+            <a:picLocks noChangeAspect="1" noChangeArrowheads="1"/>
+          </p:cNvPicPr>
+          <p:nvPr/>
+        </p:nvPicPr>
+        <p:blipFill rotWithShape="1">
+          <a:blip r:embed="rId2" cstate="print">
+            <a:duotone>
+              <a:prstClr val="black"/>
+              <a:schemeClr val="accent1">
+                <a:tint val="45000"/>
+                <a:satMod val="400000"/>
+              </a:schemeClr>
+            </a:duotone>
+            <a:extLst>
+              <a:ext uri="{BEBA8EAE-BF5A-486C-A8C5-ECC9F3942E4B}">
+                <a14:imgProps xmlns:a14="http://schemas.microsoft.com/office/drawing/2010/main">
+                  <a14:imgLayer r:embed="rId3">
+                    <a14:imgEffect>
+                      <a14:artisticLineDrawing/>
+                    </a14:imgEffect>
+                  </a14:imgLayer>
+                </a14:imgProps>
+              </a:ext>
+              <a:ext uri="{28A0092B-C50C-407E-A947-70E740481C1C}">
+                <a14:useLocalDpi xmlns:a14="http://schemas.microsoft.com/office/drawing/2010/main" val="0"/>
+              </a:ext>
+            </a:extLst>
+          </a:blip>
+          <a:srcRect r="52567" b="-2160"/>
+          <a:stretch/>
+        </p:blipFill>
+        <p:spPr bwMode="auto">
+          <a:xfrm>
+            <a:off x="241092" y="161673"/>
+            <a:ext cx="731025" cy="969492"/>
+          </a:xfrm>
+          <a:prstGeom prst="rect">
+            <a:avLst/>
+          </a:prstGeom>
+          <a:noFill/>
+          <a:extLst>
+            <a:ext uri="{909E8E84-426E-40DD-AFC4-6F175D3DCCD1}">
+              <a14:hiddenFill xmlns:a14="http://schemas.microsoft.com/office/drawing/2010/main">
+                <a:solidFill>
+                  <a:srgbClr val="FFFFFF"/>
+                </a:solidFill>
+              </a14:hiddenFill>
+            </a:ext>
+          </a:extLst>
+        </p:spPr>
+      </p:pic>
+      <p:pic>
+        <p:nvPicPr>
+          <p:cNvPr id="45" name="Picture 11" descr="http://dev.cashinonacorndog.com/images/confetti_falling.png"/>
+          <p:cNvPicPr>
+            <a:picLocks noChangeAspect="1" noChangeArrowheads="1"/>
+          </p:cNvPicPr>
+          <p:nvPr/>
+        </p:nvPicPr>
+        <p:blipFill rotWithShape="1">
+          <a:blip r:embed="rId4" cstate="print">
+            <a:duotone>
+              <a:prstClr val="black"/>
+              <a:schemeClr val="accent1">
+                <a:tint val="45000"/>
+                <a:satMod val="400000"/>
+              </a:schemeClr>
+            </a:duotone>
+            <a:extLst>
+              <a:ext uri="{BEBA8EAE-BF5A-486C-A8C5-ECC9F3942E4B}">
+                <a14:imgProps xmlns:a14="http://schemas.microsoft.com/office/drawing/2010/main">
+                  <a14:imgLayer r:embed="rId5">
+                    <a14:imgEffect>
+                      <a14:artisticLineDrawing/>
+                    </a14:imgEffect>
+                  </a14:imgLayer>
+                </a14:imgProps>
+              </a:ext>
+              <a:ext uri="{28A0092B-C50C-407E-A947-70E740481C1C}">
+                <a14:useLocalDpi xmlns:a14="http://schemas.microsoft.com/office/drawing/2010/main" val="0"/>
+              </a:ext>
+            </a:extLst>
+          </a:blip>
+          <a:srcRect l="54495" t="-1080" r="-1928" b="-1080"/>
+          <a:stretch/>
+        </p:blipFill>
+        <p:spPr bwMode="auto">
+          <a:xfrm flipH="1">
+            <a:off x="1752599" y="7875"/>
+            <a:ext cx="845849" cy="1121773"/>
+          </a:xfrm>
+          <a:prstGeom prst="rect">
+            <a:avLst/>
+          </a:prstGeom>
+          <a:noFill/>
+          <a:extLst>
+            <a:ext uri="{909E8E84-426E-40DD-AFC4-6F175D3DCCD1}">
+              <a14:hiddenFill xmlns:a14="http://schemas.microsoft.com/office/drawing/2010/main">
+                <a:solidFill>
+                  <a:srgbClr val="FFFFFF"/>
+                </a:solidFill>
+              </a14:hiddenFill>
+            </a:ext>
+          </a:extLst>
+        </p:spPr>
+      </p:pic>
+    </p:spTree>
+    <p:extLst>
+      <p:ext uri="{BB962C8B-B14F-4D97-AF65-F5344CB8AC3E}">
+        <p14:creationId xmlns:p14="http://schemas.microsoft.com/office/powerpoint/2010/main" val="2351080874"/>
+      </p:ext>
+    </p:extLst>
+  </p:cSld>
+  <p:clrMapOvr>
+    <a:masterClrMapping/>
+  </p:clrMapOvr>
+  <p:timing>
+    <p:tnLst>
+      <p:par>
+        <p:cTn id="1" dur="indefinite" restart="never" nodeType="tmRoot"/>
+      </p:par>
+    </p:tnLst>
+  </p:timing>
+</p:sld>
+</file>
+
+<file path=ppt/slides/slide5.xml><?xml version="1.0" encoding="utf-8"?>
+<p:sld xmlns:a="http://schemas.openxmlformats.org/drawingml/2006/main" xmlns:r="http://schemas.openxmlformats.org/officeDocument/2006/relationships" xmlns:p="http://schemas.openxmlformats.org/presentationml/2006/main">
+  <p:cSld>
+    <p:spTree>
+      <p:nvGrpSpPr>
+        <p:cNvPr id="1" name=""/>
+        <p:cNvGrpSpPr/>
+        <p:nvPr/>
+      </p:nvGrpSpPr>
+      <p:grpSpPr>
+        <a:xfrm>
+          <a:off x="0" y="0"/>
+          <a:ext cx="0" cy="0"/>
+          <a:chOff x="0" y="0"/>
+          <a:chExt cx="0" cy="0"/>
+        </a:xfrm>
+      </p:grpSpPr>
       <p:pic>
         <p:nvPicPr>
           <p:cNvPr id="4098" name="Picture 2" descr="C:\Users\Damith\AppData\Local\Microsoft\Windows\Temporary Internet Files\Low\Content.IE5\3C8VT45K\MC910216337[1].PNG"/>
@@ -10694,7 +12213,7 @@
 </p:sld>
 </file>
 
-<file path=ppt/slides/slide5.xml><?xml version="1.0" encoding="utf-8"?>
+<file path=ppt/slides/slide6.xml><?xml version="1.0" encoding="utf-8"?>
 <p:sld xmlns:a="http://schemas.openxmlformats.org/drawingml/2006/main" xmlns:r="http://schemas.openxmlformats.org/officeDocument/2006/relationships" xmlns:p="http://schemas.openxmlformats.org/presentationml/2006/main">
   <p:cSld>
     <p:spTree>
@@ -11722,7 +13241,7 @@
 </p:sld>
 </file>
 
-<file path=ppt/slides/slide6.xml><?xml version="1.0" encoding="utf-8"?>
+<file path=ppt/slides/slide7.xml><?xml version="1.0" encoding="utf-8"?>
 <p:sld xmlns:a="http://schemas.openxmlformats.org/drawingml/2006/main" xmlns:r="http://schemas.openxmlformats.org/officeDocument/2006/relationships" xmlns:p="http://schemas.openxmlformats.org/presentationml/2006/main">
   <p:cSld>
     <p:spTree>
@@ -11952,7 +13471,7 @@
 </p:sld>
 </file>
 
-<file path=ppt/slides/slide7.xml><?xml version="1.0" encoding="utf-8"?>
+<file path=ppt/slides/slide8.xml><?xml version="1.0" encoding="utf-8"?>
 <p:sld xmlns:a="http://schemas.openxmlformats.org/drawingml/2006/main" xmlns:r="http://schemas.openxmlformats.org/officeDocument/2006/relationships" xmlns:p="http://schemas.openxmlformats.org/presentationml/2006/main">
   <p:cSld>
     <p:spTree>

</xml_diff>